<commit_message>
Installations step for Java 17
</commit_message>
<xml_diff>
--- a/Data Modelling.pptx
+++ b/Data Modelling.pptx
@@ -125,6 +125,11 @@
       </a:defRPr>
     </a:lvl9pPr>
   </p:defaultTextStyle>
+  <p:extLst>
+    <p:ext uri="{EFAFB233-063F-42B5-8137-9DF3F51BA10A}">
+      <p15:sldGuideLst xmlns:p15="http://schemas.microsoft.com/office/powerpoint/2012/main"/>
+    </p:ext>
+  </p:extLst>
 </p:presentation>
 </file>
 
@@ -640,7 +645,7 @@
                 <a:effectLst/>
                 <a:latin typeface="Roboto" panose="02000000000000000000" pitchFamily="2" charset="0"/>
               </a:rPr>
-              <a:t>This is an ER diagram for an online shopping app data model. Customers can sign up for the app, log into the system using their credentials, and shop online. When a customer starts looking for items, the app opens a shopping cart and adds a shopping cart item for each product that the customer adds to their cart. When the customer checks out, the app reads each shopping cart item’s details, updates the shopping cart header, and generates the final bill using the same information. The app also stores each customer’s shopping history.</a:t>
+              <a:t>This is a conceptual data model for a simple order management system for a wholesale store. Customers send orders to the store, although some customers may not have sent any orders yet. An order has many order items, and each order item is for one product. There may be products that do not have an order. After gathering the products into an order, an invoice will be prepared for that order. An invoice has many invoice items, with one product in each invoice item.</a:t>
             </a:r>
           </a:p>
           <a:p>
@@ -671,7 +676,7 @@
                 <a:effectLst/>
                 <a:latin typeface="Roboto" panose="02000000000000000000" pitchFamily="2" charset="0"/>
               </a:rPr>
-              <a:t>This ER diagram contains four entities that reflect real-world object information in our physical database – Online Customer, Shopping Cart, Shopping Cart Item, and Product.</a:t>
+              <a:t>This ER diagram shows how we’ll support the above business requirements. The model has six entities (Customer, Order, Order Item, Product, Invoice, and Invoice Item) that represent the real-world information in our physical database.</a:t>
             </a:r>
           </a:p>
           <a:p>
@@ -684,7 +689,7 @@
                 <a:effectLst/>
                 <a:latin typeface="Roboto" panose="02000000000000000000" pitchFamily="2" charset="0"/>
               </a:rPr>
-              <a:t>There are three relationships required to support the above business scenario:</a:t>
+              <a:t>There are six relationships in this data model:</a:t>
             </a:r>
           </a:p>
           <a:p>
@@ -693,6 +698,16 @@
               <a:buChar char="•"/>
             </a:pPr>
             <a:r>
+              <a:rPr lang="en-US" b="0" i="0" dirty="0" err="1">
+                <a:solidFill>
+                  <a:srgbClr val="666666"/>
+                </a:solidFill>
+                <a:effectLst/>
+                <a:latin typeface="Roboto" panose="02000000000000000000" pitchFamily="2" charset="0"/>
+              </a:rPr>
+              <a:t>Customer_Order</a:t>
+            </a:r>
+            <a:r>
               <a:rPr lang="en-US" b="0" i="0" dirty="0">
                 <a:solidFill>
                   <a:srgbClr val="666666"/>
@@ -700,27 +715,7 @@
                 <a:effectLst/>
                 <a:latin typeface="Roboto" panose="02000000000000000000" pitchFamily="2" charset="0"/>
               </a:rPr>
-              <a:t>Online </a:t>
-            </a:r>
-            <a:r>
-              <a:rPr lang="en-US" b="0" i="0" dirty="0" err="1">
-                <a:solidFill>
-                  <a:srgbClr val="666666"/>
-                </a:solidFill>
-                <a:effectLst/>
-                <a:latin typeface="Roboto" panose="02000000000000000000" pitchFamily="2" charset="0"/>
-              </a:rPr>
-              <a:t>Customer_Shopping</a:t>
-            </a:r>
-            <a:r>
-              <a:rPr lang="en-US" b="0" i="0" dirty="0">
-                <a:solidFill>
-                  <a:srgbClr val="666666"/>
-                </a:solidFill>
-                <a:effectLst/>
-                <a:latin typeface="Roboto" panose="02000000000000000000" pitchFamily="2" charset="0"/>
-              </a:rPr>
-              <a:t> Cart: A one-mandatory-to-many-optional relationship.</a:t>
+              <a:t>: A one-mandatory-to-many-optional relationship.</a:t>
             </a:r>
           </a:p>
           <a:p>
@@ -729,6 +724,16 @@
               <a:buChar char="•"/>
             </a:pPr>
             <a:r>
+              <a:rPr lang="en-US" b="0" i="0" dirty="0" err="1">
+                <a:solidFill>
+                  <a:srgbClr val="666666"/>
+                </a:solidFill>
+                <a:effectLst/>
+                <a:latin typeface="Roboto" panose="02000000000000000000" pitchFamily="2" charset="0"/>
+              </a:rPr>
+              <a:t>Order_Order</a:t>
+            </a:r>
+            <a:r>
               <a:rPr lang="en-US" b="0" i="0" dirty="0">
                 <a:solidFill>
                   <a:srgbClr val="666666"/>
@@ -736,27 +741,7 @@
                 <a:effectLst/>
                 <a:latin typeface="Roboto" panose="02000000000000000000" pitchFamily="2" charset="0"/>
               </a:rPr>
-              <a:t>Shopping </a:t>
-            </a:r>
-            <a:r>
-              <a:rPr lang="en-US" b="0" i="0" dirty="0" err="1">
-                <a:solidFill>
-                  <a:srgbClr val="666666"/>
-                </a:solidFill>
-                <a:effectLst/>
-                <a:latin typeface="Roboto" panose="02000000000000000000" pitchFamily="2" charset="0"/>
-              </a:rPr>
-              <a:t>Cart_Shopping</a:t>
-            </a:r>
-            <a:r>
-              <a:rPr lang="en-US" b="0" i="0" dirty="0">
-                <a:solidFill>
-                  <a:srgbClr val="666666"/>
-                </a:solidFill>
-                <a:effectLst/>
-                <a:latin typeface="Roboto" panose="02000000000000000000" pitchFamily="2" charset="0"/>
-              </a:rPr>
-              <a:t> Cart Item: A one-mandatory-to-many-optional relationship.</a:t>
+              <a:t> Item: A one-mandatory-to-many-mandatory relationship.</a:t>
             </a:r>
           </a:p>
           <a:p>
@@ -772,7 +757,7 @@
                 <a:effectLst/>
                 <a:latin typeface="Roboto" panose="02000000000000000000" pitchFamily="2" charset="0"/>
               </a:rPr>
-              <a:t>Product_Shopping</a:t>
+              <a:t>Product_Order</a:t>
             </a:r>
             <a:r>
               <a:rPr lang="en-US" b="0" i="0" dirty="0">
@@ -782,7 +767,85 @@
                 <a:effectLst/>
                 <a:latin typeface="Roboto" panose="02000000000000000000" pitchFamily="2" charset="0"/>
               </a:rPr>
-              <a:t> Cart Item: A one-mandatory-to-many-optional relationship.</a:t>
+              <a:t> Item: A one-mandatory-to-many-optional relationship.</a:t>
+            </a:r>
+          </a:p>
+          <a:p>
+            <a:pPr algn="l">
+              <a:buFont typeface="Arial" panose="020B0604020202020204" pitchFamily="34" charset="0"/>
+              <a:buChar char="•"/>
+            </a:pPr>
+            <a:r>
+              <a:rPr lang="en-US" b="0" i="0" dirty="0" err="1">
+                <a:solidFill>
+                  <a:srgbClr val="666666"/>
+                </a:solidFill>
+                <a:effectLst/>
+                <a:latin typeface="Roboto" panose="02000000000000000000" pitchFamily="2" charset="0"/>
+              </a:rPr>
+              <a:t>Order_Invoice</a:t>
+            </a:r>
+            <a:r>
+              <a:rPr lang="en-US" b="0" i="0" dirty="0">
+                <a:solidFill>
+                  <a:srgbClr val="666666"/>
+                </a:solidFill>
+                <a:effectLst/>
+                <a:latin typeface="Roboto" panose="02000000000000000000" pitchFamily="2" charset="0"/>
+              </a:rPr>
+              <a:t>: A one-mandatory-to-one-optional relationship.</a:t>
+            </a:r>
+          </a:p>
+          <a:p>
+            <a:pPr algn="l">
+              <a:buFont typeface="Arial" panose="020B0604020202020204" pitchFamily="34" charset="0"/>
+              <a:buChar char="•"/>
+            </a:pPr>
+            <a:r>
+              <a:rPr lang="en-US" b="0" i="0" dirty="0" err="1">
+                <a:solidFill>
+                  <a:srgbClr val="666666"/>
+                </a:solidFill>
+                <a:effectLst/>
+                <a:latin typeface="Roboto" panose="02000000000000000000" pitchFamily="2" charset="0"/>
+              </a:rPr>
+              <a:t>Invoice_Invoice</a:t>
+            </a:r>
+            <a:r>
+              <a:rPr lang="en-US" b="0" i="0" dirty="0">
+                <a:solidFill>
+                  <a:srgbClr val="666666"/>
+                </a:solidFill>
+                <a:effectLst/>
+                <a:latin typeface="Roboto" panose="02000000000000000000" pitchFamily="2" charset="0"/>
+              </a:rPr>
+              <a:t> Item: A one-mandatory-to-many-mandatory relationship.</a:t>
+            </a:r>
+          </a:p>
+          <a:p>
+            <a:pPr algn="l">
+              <a:buFont typeface="Arial" panose="020B0604020202020204" pitchFamily="34" charset="0"/>
+              <a:buChar char="•"/>
+            </a:pPr>
+            <a:r>
+              <a:rPr lang="en-US" b="0" i="0" dirty="0" err="1">
+                <a:solidFill>
+                  <a:srgbClr val="666666"/>
+                </a:solidFill>
+                <a:effectLst/>
+                <a:latin typeface="Roboto" panose="02000000000000000000" pitchFamily="2" charset="0"/>
+              </a:rPr>
+              <a:t>Product_Invoice</a:t>
+            </a:r>
+            <a:r>
+              <a:rPr lang="en-US" b="0" i="0" dirty="0">
+                <a:solidFill>
+                  <a:srgbClr val="666666"/>
+                </a:solidFill>
+                <a:effectLst/>
+                <a:latin typeface="Roboto" panose="02000000000000000000" pitchFamily="2" charset="0"/>
+              </a:rPr>
+              <a:t> Item: A one-mandatory-to-many-optional relationship.</a:t>
             </a:r>
           </a:p>
           <a:p>
@@ -807,7 +870,7 @@
           <a:p>
             <a:fld id="{8B4947A1-DD1C-416D-A736-E2AC1F216378}" type="slidenum">
               <a:rPr lang="en-IN" smtClean="0"/>
-              <a:t>12</a:t>
+              <a:t>11</a:t>
             </a:fld>
             <a:endParaRPr lang="en-IN"/>
           </a:p>
@@ -816,7 +879,7 @@
     </p:spTree>
     <p:extLst>
       <p:ext uri="{BB962C8B-B14F-4D97-AF65-F5344CB8AC3E}">
-        <p14:creationId xmlns:p14="http://schemas.microsoft.com/office/powerpoint/2010/main" val="478800214"/>
+        <p14:creationId xmlns:p14="http://schemas.microsoft.com/office/powerpoint/2010/main" val="2119904506"/>
       </p:ext>
     </p:extLst>
   </p:cSld>
@@ -870,6 +933,36 @@
           <a:bodyPr/>
           <a:lstStyle/>
           <a:p>
+            <a:r>
+              <a:rPr lang="en-US" b="0" i="0" dirty="0">
+                <a:solidFill>
+                  <a:srgbClr val="666666"/>
+                </a:solidFill>
+                <a:effectLst/>
+                <a:latin typeface="Roboto" panose="02000000000000000000" pitchFamily="2" charset="0"/>
+              </a:rPr>
+              <a:t>This is an ER diagram for an online shopping app data model. Customers can sign up for the app, log into the system using their credentials, and shop online. When a customer starts looking for items, the app opens a shopping cart and adds a shopping cart item for each product that the customer adds to their cart. When the customer checks out, the app reads each shopping cart item’s details, updates the shopping cart header, and generates the final bill using the same information. The app also stores each customer’s shopping history.</a:t>
+            </a:r>
+          </a:p>
+          <a:p>
+            <a:endParaRPr lang="en-US" b="0" i="0" dirty="0">
+              <a:solidFill>
+                <a:srgbClr val="666666"/>
+              </a:solidFill>
+              <a:effectLst/>
+              <a:latin typeface="Roboto" panose="02000000000000000000" pitchFamily="2" charset="0"/>
+            </a:endParaRPr>
+          </a:p>
+          <a:p>
+            <a:endParaRPr lang="en-US" b="0" i="0" dirty="0">
+              <a:solidFill>
+                <a:srgbClr val="666666"/>
+              </a:solidFill>
+              <a:effectLst/>
+              <a:latin typeface="Roboto" panose="02000000000000000000" pitchFamily="2" charset="0"/>
+            </a:endParaRPr>
+          </a:p>
+          <a:p>
             <a:pPr algn="l"/>
             <a:r>
               <a:rPr lang="en-US" b="0" i="0" dirty="0">
@@ -879,7 +972,36 @@
                 <a:effectLst/>
                 <a:latin typeface="Roboto" panose="02000000000000000000" pitchFamily="2" charset="0"/>
               </a:rPr>
-              <a:t>We’ve got three entities here: Order, Product, and </a:t>
+              <a:t>This ER diagram contains four entities that reflect real-world object information in our physical database – Online Customer, Shopping Cart, Shopping Cart Item, and Product.</a:t>
+            </a:r>
+          </a:p>
+          <a:p>
+            <a:pPr algn="l"/>
+            <a:r>
+              <a:rPr lang="en-US" b="0" i="0" dirty="0">
+                <a:solidFill>
+                  <a:srgbClr val="666666"/>
+                </a:solidFill>
+                <a:effectLst/>
+                <a:latin typeface="Roboto" panose="02000000000000000000" pitchFamily="2" charset="0"/>
+              </a:rPr>
+              <a:t>There are three relationships required to support the above business scenario:</a:t>
+            </a:r>
+          </a:p>
+          <a:p>
+            <a:pPr algn="l">
+              <a:buFont typeface="Arial" panose="020B0604020202020204" pitchFamily="34" charset="0"/>
+              <a:buChar char="•"/>
+            </a:pPr>
+            <a:r>
+              <a:rPr lang="en-US" b="0" i="0" dirty="0">
+                <a:solidFill>
+                  <a:srgbClr val="666666"/>
+                </a:solidFill>
+                <a:effectLst/>
+                <a:latin typeface="Roboto" panose="02000000000000000000" pitchFamily="2" charset="0"/>
+              </a:rPr>
+              <a:t>Online </a:t>
             </a:r>
             <a:r>
               <a:rPr lang="en-US" b="0" i="0" dirty="0" err="1">
@@ -889,7 +1011,7 @@
                 <a:effectLst/>
                 <a:latin typeface="Roboto" panose="02000000000000000000" pitchFamily="2" charset="0"/>
               </a:rPr>
-              <a:t>ProductCategory</a:t>
+              <a:t>Customer_Shopping</a:t>
             </a:r>
             <a:r>
               <a:rPr lang="en-US" b="0" i="0" dirty="0">
@@ -899,7 +1021,23 @@
                 <a:effectLst/>
                 <a:latin typeface="Roboto" panose="02000000000000000000" pitchFamily="2" charset="0"/>
               </a:rPr>
-              <a:t>. Each of these entities has its own attributes. For example, the attributes of the Order entity are </a:t>
+              <a:t> Cart: A one-mandatory-to-many-optional relationship.</a:t>
+            </a:r>
+          </a:p>
+          <a:p>
+            <a:pPr algn="l">
+              <a:buFont typeface="Arial" panose="020B0604020202020204" pitchFamily="34" charset="0"/>
+              <a:buChar char="•"/>
+            </a:pPr>
+            <a:r>
+              <a:rPr lang="en-US" b="0" i="0" dirty="0">
+                <a:solidFill>
+                  <a:srgbClr val="666666"/>
+                </a:solidFill>
+                <a:effectLst/>
+                <a:latin typeface="Roboto" panose="02000000000000000000" pitchFamily="2" charset="0"/>
+              </a:rPr>
+              <a:t>Shopping </a:t>
             </a:r>
             <a:r>
               <a:rPr lang="en-US" b="0" i="0" dirty="0" err="1">
@@ -909,7 +1047,7 @@
                 <a:effectLst/>
                 <a:latin typeface="Roboto" panose="02000000000000000000" pitchFamily="2" charset="0"/>
               </a:rPr>
-              <a:t>Order_Id</a:t>
+              <a:t>Cart_Shopping</a:t>
             </a:r>
             <a:r>
               <a:rPr lang="en-US" b="0" i="0" dirty="0">
@@ -919,8 +1057,14 @@
                 <a:effectLst/>
                 <a:latin typeface="Roboto" panose="02000000000000000000" pitchFamily="2" charset="0"/>
               </a:rPr>
-              <a:t>, </a:t>
-            </a:r>
+              <a:t> Cart Item: A one-mandatory-to-many-optional relationship.</a:t>
+            </a:r>
+          </a:p>
+          <a:p>
+            <a:pPr algn="l">
+              <a:buFont typeface="Arial" panose="020B0604020202020204" pitchFamily="34" charset="0"/>
+              <a:buChar char="•"/>
+            </a:pPr>
             <a:r>
               <a:rPr lang="en-US" b="0" i="0" dirty="0" err="1">
                 <a:solidFill>
@@ -929,7 +1073,7 @@
                 <a:effectLst/>
                 <a:latin typeface="Roboto" panose="02000000000000000000" pitchFamily="2" charset="0"/>
               </a:rPr>
-              <a:t>Product_Id</a:t>
+              <a:t>Product_Shopping</a:t>
             </a:r>
             <a:r>
               <a:rPr lang="en-US" b="0" i="0" dirty="0">
@@ -939,126 +1083,7 @@
                 <a:effectLst/>
                 <a:latin typeface="Roboto" panose="02000000000000000000" pitchFamily="2" charset="0"/>
               </a:rPr>
-              <a:t>, </a:t>
-            </a:r>
-            <a:r>
-              <a:rPr lang="en-US" b="0" i="0" dirty="0" err="1">
-                <a:solidFill>
-                  <a:srgbClr val="666666"/>
-                </a:solidFill>
-                <a:effectLst/>
-                <a:latin typeface="Roboto" panose="02000000000000000000" pitchFamily="2" charset="0"/>
-              </a:rPr>
-              <a:t>Order_Date</a:t>
-            </a:r>
-            <a:r>
-              <a:rPr lang="en-US" b="0" i="0" dirty="0">
-                <a:solidFill>
-                  <a:srgbClr val="666666"/>
-                </a:solidFill>
-                <a:effectLst/>
-                <a:latin typeface="Roboto" panose="02000000000000000000" pitchFamily="2" charset="0"/>
-              </a:rPr>
-              <a:t>, and </a:t>
-            </a:r>
-            <a:r>
-              <a:rPr lang="en-US" b="0" i="0" dirty="0" err="1">
-                <a:solidFill>
-                  <a:srgbClr val="666666"/>
-                </a:solidFill>
-                <a:effectLst/>
-                <a:latin typeface="Roboto" panose="02000000000000000000" pitchFamily="2" charset="0"/>
-              </a:rPr>
-              <a:t>Ordered_Amount</a:t>
-            </a:r>
-            <a:r>
-              <a:rPr lang="en-US" b="0" i="0" dirty="0">
-                <a:solidFill>
-                  <a:srgbClr val="666666"/>
-                </a:solidFill>
-                <a:effectLst/>
-                <a:latin typeface="Roboto" panose="02000000000000000000" pitchFamily="2" charset="0"/>
-              </a:rPr>
-              <a:t>.</a:t>
-            </a:r>
-          </a:p>
-          <a:p>
-            <a:pPr algn="l"/>
-            <a:r>
-              <a:rPr lang="en-US" b="0" i="0" dirty="0">
-                <a:solidFill>
-                  <a:srgbClr val="666666"/>
-                </a:solidFill>
-                <a:effectLst/>
-                <a:latin typeface="Roboto" panose="02000000000000000000" pitchFamily="2" charset="0"/>
-              </a:rPr>
-              <a:t>The attributes can be divided into two groups: key and non-key; for instance, the key attribute of the Order entity is </a:t>
-            </a:r>
-            <a:r>
-              <a:rPr lang="en-US" b="0" i="0" dirty="0" err="1">
-                <a:solidFill>
-                  <a:srgbClr val="666666"/>
-                </a:solidFill>
-                <a:effectLst/>
-                <a:latin typeface="Roboto" panose="02000000000000000000" pitchFamily="2" charset="0"/>
-              </a:rPr>
-              <a:t>Order_Id</a:t>
-            </a:r>
-            <a:r>
-              <a:rPr lang="en-US" b="0" i="0" dirty="0">
-                <a:solidFill>
-                  <a:srgbClr val="666666"/>
-                </a:solidFill>
-                <a:effectLst/>
-                <a:latin typeface="Roboto" panose="02000000000000000000" pitchFamily="2" charset="0"/>
-              </a:rPr>
-              <a:t>. Also, each attribute is assigned a data type, as we’ll discuss later.</a:t>
-            </a:r>
-          </a:p>
-          <a:p>
-            <a:pPr algn="l"/>
-            <a:r>
-              <a:rPr lang="en-US" b="0" i="0" dirty="0">
-                <a:solidFill>
-                  <a:srgbClr val="666666"/>
-                </a:solidFill>
-                <a:effectLst/>
-                <a:latin typeface="Roboto" panose="02000000000000000000" pitchFamily="2" charset="0"/>
-              </a:rPr>
-              <a:t>The above logical model also contains information about the relationships between the entities. There is a one-to-many relationship between the </a:t>
-            </a:r>
-            <a:r>
-              <a:rPr lang="en-US" b="0" i="0" dirty="0" err="1">
-                <a:solidFill>
-                  <a:srgbClr val="666666"/>
-                </a:solidFill>
-                <a:effectLst/>
-                <a:latin typeface="Roboto" panose="02000000000000000000" pitchFamily="2" charset="0"/>
-              </a:rPr>
-              <a:t>ProductCategory</a:t>
-            </a:r>
-            <a:r>
-              <a:rPr lang="en-US" b="0" i="0" dirty="0">
-                <a:solidFill>
-                  <a:srgbClr val="666666"/>
-                </a:solidFill>
-                <a:effectLst/>
-                <a:latin typeface="Roboto" panose="02000000000000000000" pitchFamily="2" charset="0"/>
-              </a:rPr>
-              <a:t> and Product entities. So one category can be assigned to many products, but one product can have only one category assigned to it. Also, there is a many-to-many relationship between the Product and Order entities. As you’ve probably already figured out, one product can be assigned to many orders and one order can have many products assigned to it.</a:t>
-            </a:r>
-          </a:p>
-          <a:p>
-            <a:pPr algn="l"/>
-            <a:r>
-              <a:rPr lang="en-US" b="0" i="0" dirty="0">
-                <a:solidFill>
-                  <a:srgbClr val="666666"/>
-                </a:solidFill>
-                <a:effectLst/>
-                <a:latin typeface="Roboto" panose="02000000000000000000" pitchFamily="2" charset="0"/>
-              </a:rPr>
-              <a:t>So the logical model is a diagram presenting entities (tables) with their attributes (columns) and the relationships between them. Thus, a question arises: How is a logical model different from a physical model?</a:t>
+              <a:t> Cart Item: A one-mandatory-to-many-optional relationship.</a:t>
             </a:r>
           </a:p>
           <a:p>
@@ -1083,7 +1108,7 @@
           <a:p>
             <a:fld id="{8B4947A1-DD1C-416D-A736-E2AC1F216378}" type="slidenum">
               <a:rPr lang="en-IN" smtClean="0"/>
-              <a:t>14</a:t>
+              <a:t>12</a:t>
             </a:fld>
             <a:endParaRPr lang="en-IN"/>
           </a:p>
@@ -1092,7 +1117,7 @@
     </p:spTree>
     <p:extLst>
       <p:ext uri="{BB962C8B-B14F-4D97-AF65-F5344CB8AC3E}">
-        <p14:creationId xmlns:p14="http://schemas.microsoft.com/office/powerpoint/2010/main" val="1669600333"/>
+        <p14:creationId xmlns:p14="http://schemas.microsoft.com/office/powerpoint/2010/main" val="478800214"/>
       </p:ext>
     </p:extLst>
   </p:cSld>
@@ -1150,12 +1175,112 @@
             <a:r>
               <a:rPr lang="en-US" b="0" i="0" dirty="0">
                 <a:solidFill>
-                  <a:srgbClr val="FFFFFF"/>
-                </a:solidFill>
-                <a:effectLst/>
-                <a:latin typeface="Noto Sans" panose="020B0502040504020204" pitchFamily="34" charset="0"/>
-              </a:rPr>
-              <a:t>An easy way to comprehend when and why a logical data model would be relevant is to consider the model’s intended audience – database analysts, system analysts and designers. Logical data modeling’s audience and place in the application-design process means excluding context and detail in favor of accessibility is less relevant. The extra layer of detail (when compared to conceptual data modeling) is the context architects require to ensure new applications are compatible with the data they will encompass. Essentially, a logical data model provides the foundations necessary for productive database design.</a:t>
+                  <a:srgbClr val="666666"/>
+                </a:solidFill>
+                <a:effectLst/>
+                <a:latin typeface="Roboto" panose="02000000000000000000" pitchFamily="2" charset="0"/>
+              </a:rPr>
+              <a:t>We’ve got three entities here: Order, Product, and </a:t>
+            </a:r>
+            <a:r>
+              <a:rPr lang="en-US" b="0" i="0" dirty="0" err="1">
+                <a:solidFill>
+                  <a:srgbClr val="666666"/>
+                </a:solidFill>
+                <a:effectLst/>
+                <a:latin typeface="Roboto" panose="02000000000000000000" pitchFamily="2" charset="0"/>
+              </a:rPr>
+              <a:t>ProductCategory</a:t>
+            </a:r>
+            <a:r>
+              <a:rPr lang="en-US" b="0" i="0" dirty="0">
+                <a:solidFill>
+                  <a:srgbClr val="666666"/>
+                </a:solidFill>
+                <a:effectLst/>
+                <a:latin typeface="Roboto" panose="02000000000000000000" pitchFamily="2" charset="0"/>
+              </a:rPr>
+              <a:t>. Each of these entities has its own attributes. For example, the attributes of the Order entity are </a:t>
+            </a:r>
+            <a:r>
+              <a:rPr lang="en-US" b="0" i="0" dirty="0" err="1">
+                <a:solidFill>
+                  <a:srgbClr val="666666"/>
+                </a:solidFill>
+                <a:effectLst/>
+                <a:latin typeface="Roboto" panose="02000000000000000000" pitchFamily="2" charset="0"/>
+              </a:rPr>
+              <a:t>Order_Id</a:t>
+            </a:r>
+            <a:r>
+              <a:rPr lang="en-US" b="0" i="0" dirty="0">
+                <a:solidFill>
+                  <a:srgbClr val="666666"/>
+                </a:solidFill>
+                <a:effectLst/>
+                <a:latin typeface="Roboto" panose="02000000000000000000" pitchFamily="2" charset="0"/>
+              </a:rPr>
+              <a:t>, </a:t>
+            </a:r>
+            <a:r>
+              <a:rPr lang="en-US" b="0" i="0" dirty="0" err="1">
+                <a:solidFill>
+                  <a:srgbClr val="666666"/>
+                </a:solidFill>
+                <a:effectLst/>
+                <a:latin typeface="Roboto" panose="02000000000000000000" pitchFamily="2" charset="0"/>
+              </a:rPr>
+              <a:t>Product_Id</a:t>
+            </a:r>
+            <a:r>
+              <a:rPr lang="en-US" b="0" i="0" dirty="0">
+                <a:solidFill>
+                  <a:srgbClr val="666666"/>
+                </a:solidFill>
+                <a:effectLst/>
+                <a:latin typeface="Roboto" panose="02000000000000000000" pitchFamily="2" charset="0"/>
+              </a:rPr>
+              <a:t>, </a:t>
+            </a:r>
+            <a:r>
+              <a:rPr lang="en-US" b="0" i="0" dirty="0" err="1">
+                <a:solidFill>
+                  <a:srgbClr val="666666"/>
+                </a:solidFill>
+                <a:effectLst/>
+                <a:latin typeface="Roboto" panose="02000000000000000000" pitchFamily="2" charset="0"/>
+              </a:rPr>
+              <a:t>Order_Date</a:t>
+            </a:r>
+            <a:r>
+              <a:rPr lang="en-US" b="0" i="0" dirty="0">
+                <a:solidFill>
+                  <a:srgbClr val="666666"/>
+                </a:solidFill>
+                <a:effectLst/>
+                <a:latin typeface="Roboto" panose="02000000000000000000" pitchFamily="2" charset="0"/>
+              </a:rPr>
+              <a:t>, and </a:t>
+            </a:r>
+            <a:r>
+              <a:rPr lang="en-US" b="0" i="0" dirty="0" err="1">
+                <a:solidFill>
+                  <a:srgbClr val="666666"/>
+                </a:solidFill>
+                <a:effectLst/>
+                <a:latin typeface="Roboto" panose="02000000000000000000" pitchFamily="2" charset="0"/>
+              </a:rPr>
+              <a:t>Ordered_Amount</a:t>
+            </a:r>
+            <a:r>
+              <a:rPr lang="en-US" b="0" i="0" dirty="0">
+                <a:solidFill>
+                  <a:srgbClr val="666666"/>
+                </a:solidFill>
+                <a:effectLst/>
+                <a:latin typeface="Roboto" panose="02000000000000000000" pitchFamily="2" charset="0"/>
+              </a:rPr>
+              <a:t>.</a:t>
             </a:r>
           </a:p>
           <a:p>
@@ -1163,12 +1288,32 @@
             <a:r>
               <a:rPr lang="en-US" b="0" i="0" dirty="0">
                 <a:solidFill>
-                  <a:srgbClr val="FFFFFF"/>
-                </a:solidFill>
-                <a:effectLst/>
-                <a:latin typeface="Noto Sans" panose="020B0502040504020204" pitchFamily="34" charset="0"/>
-              </a:rPr>
-              <a:t>Without a logical data model, designers can only really figure out a new application’s requirements as they go. This will often mean working with unorganized data elements that make overlooking such requirements more likely. So, skipping the logical data modeling stage in favor of building a physical data model can lead to poor database design and applications that do not function as intended. Addressing such missteps requires a reactive approach that can slow down time to market and increase the total costs associated with the development process.</a:t>
+                  <a:srgbClr val="666666"/>
+                </a:solidFill>
+                <a:effectLst/>
+                <a:latin typeface="Roboto" panose="02000000000000000000" pitchFamily="2" charset="0"/>
+              </a:rPr>
+              <a:t>The attributes can be divided into two groups: key and non-key; for instance, the key attribute of the Order entity is </a:t>
+            </a:r>
+            <a:r>
+              <a:rPr lang="en-US" b="0" i="0" dirty="0" err="1">
+                <a:solidFill>
+                  <a:srgbClr val="666666"/>
+                </a:solidFill>
+                <a:effectLst/>
+                <a:latin typeface="Roboto" panose="02000000000000000000" pitchFamily="2" charset="0"/>
+              </a:rPr>
+              <a:t>Order_Id</a:t>
+            </a:r>
+            <a:r>
+              <a:rPr lang="en-US" b="0" i="0" dirty="0">
+                <a:solidFill>
+                  <a:srgbClr val="666666"/>
+                </a:solidFill>
+                <a:effectLst/>
+                <a:latin typeface="Roboto" panose="02000000000000000000" pitchFamily="2" charset="0"/>
+              </a:rPr>
+              <a:t>. Also, each attribute is assigned a data type, as we’ll discuss later.</a:t>
             </a:r>
           </a:p>
           <a:p>
@@ -1176,12 +1321,45 @@
             <a:r>
               <a:rPr lang="en-US" b="0" i="0" dirty="0">
                 <a:solidFill>
-                  <a:srgbClr val="FFFFFF"/>
-                </a:solidFill>
-                <a:effectLst/>
-                <a:latin typeface="Noto Sans" panose="020B0502040504020204" pitchFamily="34" charset="0"/>
-              </a:rPr>
-              <a:t>Additionally, the technology-agnostic nature of a logical data model helps organizations establish opportunities for process improvements. This means new applications can be built to be as effective as possible, rather than as effective as current technological constraints allow.</a:t>
+                  <a:srgbClr val="666666"/>
+                </a:solidFill>
+                <a:effectLst/>
+                <a:latin typeface="Roboto" panose="02000000000000000000" pitchFamily="2" charset="0"/>
+              </a:rPr>
+              <a:t>The above logical model also contains information about the relationships between the entities. There is a one-to-many relationship between the </a:t>
+            </a:r>
+            <a:r>
+              <a:rPr lang="en-US" b="0" i="0" dirty="0" err="1">
+                <a:solidFill>
+                  <a:srgbClr val="666666"/>
+                </a:solidFill>
+                <a:effectLst/>
+                <a:latin typeface="Roboto" panose="02000000000000000000" pitchFamily="2" charset="0"/>
+              </a:rPr>
+              <a:t>ProductCategory</a:t>
+            </a:r>
+            <a:r>
+              <a:rPr lang="en-US" b="0" i="0" dirty="0">
+                <a:solidFill>
+                  <a:srgbClr val="666666"/>
+                </a:solidFill>
+                <a:effectLst/>
+                <a:latin typeface="Roboto" panose="02000000000000000000" pitchFamily="2" charset="0"/>
+              </a:rPr>
+              <a:t> and Product entities. So one category can be assigned to many products, but one product can have only one category assigned to it. Also, there is a many-to-many relationship between the Product and Order entities. As you’ve probably already figured out, one product can be assigned to many orders and one order can have many products assigned to it.</a:t>
+            </a:r>
+          </a:p>
+          <a:p>
+            <a:pPr algn="l"/>
+            <a:r>
+              <a:rPr lang="en-US" b="0" i="0" dirty="0">
+                <a:solidFill>
+                  <a:srgbClr val="666666"/>
+                </a:solidFill>
+                <a:effectLst/>
+                <a:latin typeface="Roboto" panose="02000000000000000000" pitchFamily="2" charset="0"/>
+              </a:rPr>
+              <a:t>So the logical model is a diagram presenting entities (tables) with their attributes (columns) and the relationships between them. Thus, a question arises: How is a logical model different from a physical model?</a:t>
             </a:r>
           </a:p>
           <a:p>
@@ -1206,7 +1384,7 @@
           <a:p>
             <a:fld id="{8B4947A1-DD1C-416D-A736-E2AC1F216378}" type="slidenum">
               <a:rPr lang="en-IN" smtClean="0"/>
-              <a:t>15</a:t>
+              <a:t>14</a:t>
             </a:fld>
             <a:endParaRPr lang="en-IN"/>
           </a:p>
@@ -1215,7 +1393,7 @@
     </p:spTree>
     <p:extLst>
       <p:ext uri="{BB962C8B-B14F-4D97-AF65-F5344CB8AC3E}">
-        <p14:creationId xmlns:p14="http://schemas.microsoft.com/office/powerpoint/2010/main" val="3706685802"/>
+        <p14:creationId xmlns:p14="http://schemas.microsoft.com/office/powerpoint/2010/main" val="1669600333"/>
       </p:ext>
     </p:extLst>
   </p:cSld>
@@ -1271,14 +1449,14 @@
           <a:p>
             <a:pPr algn="l"/>
             <a:r>
-              <a:rPr lang="en-US" b="1" i="0" dirty="0">
-                <a:solidFill>
-                  <a:srgbClr val="26276D"/>
+              <a:rPr lang="en-US" b="0" i="0" dirty="0">
+                <a:solidFill>
+                  <a:srgbClr val="FFFFFF"/>
                 </a:solidFill>
                 <a:effectLst/>
                 <a:latin typeface="Noto Sans" panose="020B0502040504020204" pitchFamily="34" charset="0"/>
               </a:rPr>
-              <a:t>Help organizations identify areas for business process improvement</a:t>
+              <a:t>An easy way to comprehend when and why a logical data model would be relevant is to consider the model’s intended audience – database analysts, system analysts and designers. Logical data modeling’s audience and place in the application-design process means excluding context and detail in favor of accessibility is less relevant. The extra layer of detail (when compared to conceptual data modeling) is the context architects require to ensure new applications are compatible with the data they will encompass. Essentially, a logical data model provides the foundations necessary for productive database design.</a:t>
             </a:r>
           </a:p>
           <a:p>
@@ -1286,96 +1464,28 @@
             <a:r>
               <a:rPr lang="en-US" b="0" i="0" dirty="0">
                 <a:solidFill>
-                  <a:srgbClr val="5C5D61"/>
+                  <a:srgbClr val="FFFFFF"/>
                 </a:solidFill>
                 <a:effectLst/>
                 <a:latin typeface="Noto Sans" panose="020B0502040504020204" pitchFamily="34" charset="0"/>
               </a:rPr>
-              <a:t>By building a model untethered to current technological constraints, organizations can identify what is required to realize the ideal version of the model.</a:t>
+              <a:t>Without a logical data model, designers can only really figure out a new application’s requirements as they go. This will often mean working with unorganized data elements that make overlooking such requirements more likely. So, skipping the logical data modeling stage in favor of building a physical data model can lead to poor database design and applications that do not function as intended. Addressing such missteps requires a reactive approach that can slow down time to market and increase the total costs associated with the development process.</a:t>
             </a:r>
           </a:p>
           <a:p>
             <a:pPr algn="l"/>
             <a:r>
-              <a:rPr lang="en-US" b="1" i="0" dirty="0">
-                <a:solidFill>
-                  <a:srgbClr val="26276D"/>
+              <a:rPr lang="en-US" b="0" i="0" dirty="0">
+                <a:solidFill>
+                  <a:srgbClr val="FFFFFF"/>
                 </a:solidFill>
                 <a:effectLst/>
                 <a:latin typeface="Noto Sans" panose="020B0502040504020204" pitchFamily="34" charset="0"/>
               </a:rPr>
-              <a:t>Design well-informed applications</a:t>
-            </a:r>
-          </a:p>
-          <a:p>
-            <a:pPr algn="l"/>
-            <a:r>
-              <a:rPr lang="en-US" b="0" i="0" dirty="0">
-                <a:solidFill>
-                  <a:srgbClr val="5C5D61"/>
-                </a:solidFill>
-                <a:effectLst/>
-                <a:latin typeface="Noto Sans" panose="020B0502040504020204" pitchFamily="34" charset="0"/>
-              </a:rPr>
-              <a:t>By accounting for the attributes of data elements, we can reduce the amount of semantic oversight that could lead to problems down the road. Data elements are better defined, and the relationships between them are more complete.</a:t>
-            </a:r>
-          </a:p>
-          <a:p>
-            <a:pPr algn="l"/>
-            <a:r>
-              <a:rPr lang="en-US" b="1" i="0" dirty="0">
-                <a:solidFill>
-                  <a:srgbClr val="26276D"/>
-                </a:solidFill>
-                <a:effectLst/>
-                <a:latin typeface="Noto Sans" panose="020B0502040504020204" pitchFamily="34" charset="0"/>
-              </a:rPr>
-              <a:t>Reduce costs and increase efficiency</a:t>
-            </a:r>
-          </a:p>
-          <a:p>
-            <a:pPr algn="l"/>
-            <a:r>
-              <a:rPr lang="en-US" b="0" i="0" dirty="0">
-                <a:solidFill>
-                  <a:srgbClr val="5C5D61"/>
-                </a:solidFill>
-                <a:effectLst/>
-                <a:latin typeface="Noto Sans" panose="020B0502040504020204" pitchFamily="34" charset="0"/>
-              </a:rPr>
-              <a:t>By mitigating the potential for oversights, organizations reduce the risk of botched implementations and the need for revisions post-launch. Additionally, data re-use and sharing is encouraged and data redundancy and inconsistencies can be avoided.</a:t>
-            </a:r>
-          </a:p>
-          <a:p>
-            <a:pPr algn="l"/>
-            <a:r>
-              <a:rPr lang="en-US" b="1" i="0" dirty="0">
-                <a:solidFill>
-                  <a:srgbClr val="26276D"/>
-                </a:solidFill>
-                <a:effectLst/>
-                <a:latin typeface="Noto Sans" panose="020B0502040504020204" pitchFamily="34" charset="0"/>
-              </a:rPr>
-              <a:t>Provide a basis for future models</a:t>
-            </a:r>
-          </a:p>
-          <a:p>
-            <a:pPr algn="l"/>
-            <a:r>
-              <a:rPr lang="en-US" b="0" i="0" dirty="0">
-                <a:solidFill>
-                  <a:srgbClr val="5C5D61"/>
-                </a:solidFill>
-                <a:effectLst/>
-                <a:latin typeface="Noto Sans" panose="020B0502040504020204" pitchFamily="34" charset="0"/>
-              </a:rPr>
-              <a:t>Just as a conceptual data model provides the basis for a logical data model, a logical data model provides the detailed design to be targeted and tuned to a specific technology in the physical data modeling stage.</a:t>
-            </a:r>
-          </a:p>
-          <a:p>
-            <a:br>
-              <a:rPr lang="en-US" dirty="0"/>
-            </a:br>
+              <a:t>Additionally, the technology-agnostic nature of a logical data model helps organizations establish opportunities for process improvements. This means new applications can be built to be as effective as possible, rather than as effective as current technological constraints allow.</a:t>
+            </a:r>
+          </a:p>
+          <a:p>
             <a:endParaRPr lang="en-IN" dirty="0"/>
           </a:p>
         </p:txBody>
@@ -1397,7 +1507,7 @@
           <a:p>
             <a:fld id="{8B4947A1-DD1C-416D-A736-E2AC1F216378}" type="slidenum">
               <a:rPr lang="en-IN" smtClean="0"/>
-              <a:t>16</a:t>
+              <a:t>15</a:t>
             </a:fld>
             <a:endParaRPr lang="en-IN"/>
           </a:p>
@@ -1406,7 +1516,7 @@
     </p:spTree>
     <p:extLst>
       <p:ext uri="{BB962C8B-B14F-4D97-AF65-F5344CB8AC3E}">
-        <p14:creationId xmlns:p14="http://schemas.microsoft.com/office/powerpoint/2010/main" val="1367229685"/>
+        <p14:creationId xmlns:p14="http://schemas.microsoft.com/office/powerpoint/2010/main" val="3706685802"/>
       </p:ext>
     </p:extLst>
   </p:cSld>
@@ -1460,6 +1570,197 @@
           <a:bodyPr/>
           <a:lstStyle/>
           <a:p>
+            <a:pPr algn="l"/>
+            <a:r>
+              <a:rPr lang="en-US" b="1" i="0" dirty="0">
+                <a:solidFill>
+                  <a:srgbClr val="26276D"/>
+                </a:solidFill>
+                <a:effectLst/>
+                <a:latin typeface="Noto Sans" panose="020B0502040504020204" pitchFamily="34" charset="0"/>
+              </a:rPr>
+              <a:t>Help organizations identify areas for business process improvement</a:t>
+            </a:r>
+          </a:p>
+          <a:p>
+            <a:pPr algn="l"/>
+            <a:r>
+              <a:rPr lang="en-US" b="0" i="0" dirty="0">
+                <a:solidFill>
+                  <a:srgbClr val="5C5D61"/>
+                </a:solidFill>
+                <a:effectLst/>
+                <a:latin typeface="Noto Sans" panose="020B0502040504020204" pitchFamily="34" charset="0"/>
+              </a:rPr>
+              <a:t>By building a model untethered to current technological constraints, organizations can identify what is required to realize the ideal version of the model.</a:t>
+            </a:r>
+          </a:p>
+          <a:p>
+            <a:pPr algn="l"/>
+            <a:r>
+              <a:rPr lang="en-US" b="1" i="0" dirty="0">
+                <a:solidFill>
+                  <a:srgbClr val="26276D"/>
+                </a:solidFill>
+                <a:effectLst/>
+                <a:latin typeface="Noto Sans" panose="020B0502040504020204" pitchFamily="34" charset="0"/>
+              </a:rPr>
+              <a:t>Design well-informed applications</a:t>
+            </a:r>
+          </a:p>
+          <a:p>
+            <a:pPr algn="l"/>
+            <a:r>
+              <a:rPr lang="en-US" b="0" i="0" dirty="0">
+                <a:solidFill>
+                  <a:srgbClr val="5C5D61"/>
+                </a:solidFill>
+                <a:effectLst/>
+                <a:latin typeface="Noto Sans" panose="020B0502040504020204" pitchFamily="34" charset="0"/>
+              </a:rPr>
+              <a:t>By accounting for the attributes of data elements, we can reduce the amount of semantic oversight that could lead to problems down the road. Data elements are better defined, and the relationships between them are more complete.</a:t>
+            </a:r>
+          </a:p>
+          <a:p>
+            <a:pPr algn="l"/>
+            <a:r>
+              <a:rPr lang="en-US" b="1" i="0" dirty="0">
+                <a:solidFill>
+                  <a:srgbClr val="26276D"/>
+                </a:solidFill>
+                <a:effectLst/>
+                <a:latin typeface="Noto Sans" panose="020B0502040504020204" pitchFamily="34" charset="0"/>
+              </a:rPr>
+              <a:t>Reduce costs and increase efficiency</a:t>
+            </a:r>
+          </a:p>
+          <a:p>
+            <a:pPr algn="l"/>
+            <a:r>
+              <a:rPr lang="en-US" b="0" i="0" dirty="0">
+                <a:solidFill>
+                  <a:srgbClr val="5C5D61"/>
+                </a:solidFill>
+                <a:effectLst/>
+                <a:latin typeface="Noto Sans" panose="020B0502040504020204" pitchFamily="34" charset="0"/>
+              </a:rPr>
+              <a:t>By mitigating the potential for oversights, organizations reduce the risk of botched implementations and the need for revisions post-launch. Additionally, data re-use and sharing is encouraged and data redundancy and inconsistencies can be avoided.</a:t>
+            </a:r>
+          </a:p>
+          <a:p>
+            <a:pPr algn="l"/>
+            <a:r>
+              <a:rPr lang="en-US" b="1" i="0" dirty="0">
+                <a:solidFill>
+                  <a:srgbClr val="26276D"/>
+                </a:solidFill>
+                <a:effectLst/>
+                <a:latin typeface="Noto Sans" panose="020B0502040504020204" pitchFamily="34" charset="0"/>
+              </a:rPr>
+              <a:t>Provide a basis for future models</a:t>
+            </a:r>
+          </a:p>
+          <a:p>
+            <a:pPr algn="l"/>
+            <a:r>
+              <a:rPr lang="en-US" b="0" i="0" dirty="0">
+                <a:solidFill>
+                  <a:srgbClr val="5C5D61"/>
+                </a:solidFill>
+                <a:effectLst/>
+                <a:latin typeface="Noto Sans" panose="020B0502040504020204" pitchFamily="34" charset="0"/>
+              </a:rPr>
+              <a:t>Just as a conceptual data model provides the basis for a logical data model, a logical data model provides the detailed design to be targeted and tuned to a specific technology in the physical data modeling stage.</a:t>
+            </a:r>
+          </a:p>
+          <a:p>
+            <a:br>
+              <a:rPr lang="en-US" dirty="0"/>
+            </a:br>
+            <a:endParaRPr lang="en-IN" dirty="0"/>
+          </a:p>
+        </p:txBody>
+      </p:sp>
+      <p:sp>
+        <p:nvSpPr>
+          <p:cNvPr id="4" name="Slide Number Placeholder 3"/>
+          <p:cNvSpPr>
+            <a:spLocks noGrp="1"/>
+          </p:cNvSpPr>
+          <p:nvPr>
+            <p:ph type="sldNum" sz="quarter" idx="5"/>
+          </p:nvPr>
+        </p:nvSpPr>
+        <p:spPr/>
+        <p:txBody>
+          <a:bodyPr/>
+          <a:lstStyle/>
+          <a:p>
+            <a:fld id="{8B4947A1-DD1C-416D-A736-E2AC1F216378}" type="slidenum">
+              <a:rPr lang="en-IN" smtClean="0"/>
+              <a:t>16</a:t>
+            </a:fld>
+            <a:endParaRPr lang="en-IN"/>
+          </a:p>
+        </p:txBody>
+      </p:sp>
+    </p:spTree>
+    <p:extLst>
+      <p:ext uri="{BB962C8B-B14F-4D97-AF65-F5344CB8AC3E}">
+        <p14:creationId xmlns:p14="http://schemas.microsoft.com/office/powerpoint/2010/main" val="1367229685"/>
+      </p:ext>
+    </p:extLst>
+  </p:cSld>
+  <p:clrMapOvr>
+    <a:masterClrMapping/>
+  </p:clrMapOvr>
+</p:notes>
+</file>
+
+<file path=ppt/notesSlides/notesSlide15.xml><?xml version="1.0" encoding="utf-8"?>
+<p:notes xmlns:a="http://schemas.openxmlformats.org/drawingml/2006/main" xmlns:r="http://schemas.openxmlformats.org/officeDocument/2006/relationships" xmlns:p="http://schemas.openxmlformats.org/presentationml/2006/main">
+  <p:cSld>
+    <p:spTree>
+      <p:nvGrpSpPr>
+        <p:cNvPr id="1" name=""/>
+        <p:cNvGrpSpPr/>
+        <p:nvPr/>
+      </p:nvGrpSpPr>
+      <p:grpSpPr>
+        <a:xfrm>
+          <a:off x="0" y="0"/>
+          <a:ext cx="0" cy="0"/>
+          <a:chOff x="0" y="0"/>
+          <a:chExt cx="0" cy="0"/>
+        </a:xfrm>
+      </p:grpSpPr>
+      <p:sp>
+        <p:nvSpPr>
+          <p:cNvPr id="2" name="Slide Image Placeholder 1"/>
+          <p:cNvSpPr>
+            <a:spLocks noGrp="1" noRot="1" noChangeAspect="1"/>
+          </p:cNvSpPr>
+          <p:nvPr>
+            <p:ph type="sldImg"/>
+          </p:nvPr>
+        </p:nvSpPr>
+        <p:spPr/>
+      </p:sp>
+      <p:sp>
+        <p:nvSpPr>
+          <p:cNvPr id="3" name="Notes Placeholder 2"/>
+          <p:cNvSpPr>
+            <a:spLocks noGrp="1"/>
+          </p:cNvSpPr>
+          <p:nvPr>
+            <p:ph type="body" idx="1"/>
+          </p:nvPr>
+        </p:nvSpPr>
+        <p:spPr/>
+        <p:txBody>
+          <a:bodyPr/>
+          <a:lstStyle/>
+          <a:p>
             <a:r>
               <a:rPr lang="en-US" b="0" i="0" dirty="0">
                 <a:solidFill>
@@ -1576,7 +1877,7 @@
 </p:notes>
 </file>
 
-<file path=ppt/notesSlides/notesSlide15.xml><?xml version="1.0" encoding="utf-8"?>
+<file path=ppt/notesSlides/notesSlide16.xml><?xml version="1.0" encoding="utf-8"?>
 <p:notes xmlns:a="http://schemas.openxmlformats.org/drawingml/2006/main" xmlns:r="http://schemas.openxmlformats.org/officeDocument/2006/relationships" xmlns:p="http://schemas.openxmlformats.org/presentationml/2006/main">
   <p:cSld>
     <p:spTree>
@@ -2102,217 +2403,28 @@
           <a:bodyPr/>
           <a:lstStyle/>
           <a:p>
-            <a:pPr algn="l"/>
-            <a:r>
-              <a:rPr lang="en-US" b="0" i="0" dirty="0">
-                <a:solidFill>
-                  <a:srgbClr val="394559"/>
-                </a:solidFill>
-                <a:effectLst/>
-                <a:latin typeface="Roboto" panose="02000000000000000000" pitchFamily="2" charset="0"/>
-              </a:rPr>
-              <a:t>Data Modelling is a process to formulate data in an information system in a structured format. Listed below are certain practical uses of the related tools in any sector or industry.</a:t>
-            </a:r>
-          </a:p>
-          <a:p>
-            <a:pPr algn="l">
-              <a:buFont typeface="Arial" panose="020B0604020202020204" pitchFamily="34" charset="0"/>
-              <a:buChar char="•"/>
-            </a:pPr>
-            <a:r>
-              <a:rPr lang="en-US" b="0" i="0" dirty="0">
-                <a:solidFill>
-                  <a:srgbClr val="394559"/>
-                </a:solidFill>
-                <a:effectLst/>
-                <a:latin typeface="Roboto" panose="02000000000000000000" pitchFamily="2" charset="0"/>
-              </a:rPr>
-              <a:t>It helps create a robust design with a data model that can show an organization's entire data on the same platform.</a:t>
-            </a:r>
-          </a:p>
-          <a:p>
-            <a:pPr algn="l">
-              <a:buFont typeface="Arial" panose="020B0604020202020204" pitchFamily="34" charset="0"/>
-              <a:buChar char="•"/>
-            </a:pPr>
-            <a:r>
-              <a:rPr lang="en-US" b="0" i="0" dirty="0">
-                <a:solidFill>
-                  <a:srgbClr val="394559"/>
-                </a:solidFill>
-                <a:effectLst/>
-                <a:latin typeface="Roboto" panose="02000000000000000000" pitchFamily="2" charset="0"/>
-              </a:rPr>
-              <a:t>The data model makes sure that all the data objects required by the database are represented or not.</a:t>
-            </a:r>
-          </a:p>
-          <a:p>
-            <a:pPr algn="l">
-              <a:buFont typeface="Arial" panose="020B0604020202020204" pitchFamily="34" charset="0"/>
-              <a:buChar char="•"/>
-            </a:pPr>
-            <a:r>
-              <a:rPr lang="en-US" b="0" i="0" dirty="0">
-                <a:solidFill>
-                  <a:srgbClr val="394559"/>
-                </a:solidFill>
-                <a:effectLst/>
-                <a:latin typeface="Roboto" panose="02000000000000000000" pitchFamily="2" charset="0"/>
-              </a:rPr>
-              <a:t>The database at the logical, physical, and conceptual levels can be designed with the help data model.</a:t>
-            </a:r>
-          </a:p>
-          <a:p>
-            <a:pPr algn="l">
-              <a:buFont typeface="Arial" panose="020B0604020202020204" pitchFamily="34" charset="0"/>
-              <a:buChar char="•"/>
-            </a:pPr>
-            <a:r>
-              <a:rPr lang="en-US" b="0" i="0" dirty="0">
-                <a:solidFill>
-                  <a:srgbClr val="394559"/>
-                </a:solidFill>
-                <a:effectLst/>
-                <a:latin typeface="Roboto" panose="02000000000000000000" pitchFamily="2" charset="0"/>
-              </a:rPr>
-              <a:t>The relation tables, foreign keys, and primary keys can be defined with the data model's help.</a:t>
-            </a:r>
-          </a:p>
-          <a:p>
-            <a:pPr algn="l">
-              <a:buFont typeface="Arial" panose="020B0604020202020204" pitchFamily="34" charset="0"/>
-              <a:buChar char="•"/>
-            </a:pPr>
-            <a:r>
-              <a:rPr lang="en-US" b="0" i="0" dirty="0">
-                <a:solidFill>
-                  <a:srgbClr val="394559"/>
-                </a:solidFill>
-                <a:effectLst/>
-                <a:latin typeface="Roboto" panose="02000000000000000000" pitchFamily="2" charset="0"/>
-              </a:rPr>
-              <a:t>The Tools help in the improvement of </a:t>
-            </a:r>
-            <a:r>
-              <a:rPr lang="en-US" b="0" i="0" u="none" strike="noStrike" dirty="0">
-                <a:solidFill>
-                  <a:srgbClr val="1450A8"/>
-                </a:solidFill>
-                <a:effectLst/>
-                <a:latin typeface="Roboto" panose="02000000000000000000" pitchFamily="2" charset="0"/>
-                <a:hlinkClick r:id="rId3"/>
-              </a:rPr>
-              <a:t>data quality</a:t>
-            </a:r>
-            <a:r>
-              <a:rPr lang="en-US" b="0" i="0" dirty="0">
-                <a:solidFill>
-                  <a:srgbClr val="394559"/>
-                </a:solidFill>
-                <a:effectLst/>
-                <a:latin typeface="Roboto" panose="02000000000000000000" pitchFamily="2" charset="0"/>
-              </a:rPr>
-              <a:t>.</a:t>
-            </a:r>
-          </a:p>
-          <a:p>
-            <a:pPr algn="l">
-              <a:buFont typeface="Arial" panose="020B0604020202020204" pitchFamily="34" charset="0"/>
-              <a:buChar char="•"/>
-            </a:pPr>
-            <a:r>
-              <a:rPr lang="en-US" b="0" i="0" dirty="0">
-                <a:solidFill>
-                  <a:srgbClr val="394559"/>
-                </a:solidFill>
-                <a:effectLst/>
-                <a:latin typeface="Roboto" panose="02000000000000000000" pitchFamily="2" charset="0"/>
-              </a:rPr>
-              <a:t>Data Model gives the clear picture of business requirements.</a:t>
-            </a:r>
-          </a:p>
-          <a:p>
-            <a:pPr algn="l">
-              <a:buFont typeface="Arial" panose="020B0604020202020204" pitchFamily="34" charset="0"/>
-              <a:buChar char="•"/>
-            </a:pPr>
-            <a:r>
-              <a:rPr lang="en-US" b="0" i="0" dirty="0">
-                <a:solidFill>
-                  <a:srgbClr val="394559"/>
-                </a:solidFill>
-                <a:effectLst/>
-                <a:latin typeface="Roboto" panose="02000000000000000000" pitchFamily="2" charset="0"/>
-              </a:rPr>
-              <a:t>Redundant data and missing data can be identified with the help of data models.</a:t>
-            </a:r>
-          </a:p>
-          <a:p>
-            <a:pPr algn="l">
-              <a:buFont typeface="Arial" panose="020B0604020202020204" pitchFamily="34" charset="0"/>
-              <a:buChar char="•"/>
-            </a:pPr>
-            <a:r>
-              <a:rPr lang="en-US" b="0" i="0" dirty="0">
-                <a:solidFill>
-                  <a:srgbClr val="394559"/>
-                </a:solidFill>
-                <a:effectLst/>
-                <a:latin typeface="Roboto" panose="02000000000000000000" pitchFamily="2" charset="0"/>
-              </a:rPr>
-              <a:t>In data models, all the important data is accurately represented. The chances of incorrect results and faulty reports decreased as the data model reduces data omission.</a:t>
-            </a:r>
-          </a:p>
-          <a:p>
-            <a:pPr algn="l">
-              <a:buFont typeface="Arial" panose="020B0604020202020204" pitchFamily="34" charset="0"/>
-              <a:buChar char="•"/>
-            </a:pPr>
-            <a:r>
-              <a:rPr lang="en-US" b="0" i="0" dirty="0">
-                <a:solidFill>
-                  <a:srgbClr val="394559"/>
-                </a:solidFill>
-                <a:effectLst/>
-                <a:latin typeface="Roboto" panose="02000000000000000000" pitchFamily="2" charset="0"/>
-              </a:rPr>
-              <a:t>The data models create a visual representation of the data. With the help of it, the data analysis gets improved. We get the data picture, which can then be used by developers to create a physical database.</a:t>
-            </a:r>
-          </a:p>
-          <a:p>
-            <a:pPr algn="l">
-              <a:buFont typeface="Arial" panose="020B0604020202020204" pitchFamily="34" charset="0"/>
-              <a:buChar char="•"/>
-            </a:pPr>
-            <a:r>
-              <a:rPr lang="en-US" b="0" i="0" dirty="0">
-                <a:solidFill>
-                  <a:srgbClr val="394559"/>
-                </a:solidFill>
-                <a:effectLst/>
-                <a:latin typeface="Roboto" panose="02000000000000000000" pitchFamily="2" charset="0"/>
-              </a:rPr>
-              <a:t>Better consistency can be qualified with the help of a data model across all the projects.</a:t>
-            </a:r>
-          </a:p>
-          <a:p>
-            <a:pPr algn="l">
-              <a:buFont typeface="Arial" panose="020B0604020202020204" pitchFamily="34" charset="0"/>
-              <a:buChar char="•"/>
-            </a:pPr>
-            <a:r>
-              <a:rPr lang="en-US" b="0" i="0" dirty="0">
-                <a:solidFill>
-                  <a:srgbClr val="394559"/>
-                </a:solidFill>
-                <a:effectLst/>
-                <a:latin typeface="Roboto" panose="02000000000000000000" pitchFamily="2" charset="0"/>
-              </a:rPr>
-              <a:t>The model is quite a time consuming, but it makes the maintenance cheaper and faster.</a:t>
+            <a:r>
+              <a:rPr lang="en-IN" dirty="0"/>
+              <a:t>https://dbdiagram.io/</a:t>
             </a:r>
           </a:p>
           <a:p>
             <a:endParaRPr lang="en-IN" dirty="0"/>
+          </a:p>
+          <a:p>
+            <a:r>
+              <a:rPr lang="en-IN" dirty="0"/>
+              <a:t>https://www.erwin.com/products/erwin-data-modeler/</a:t>
+            </a:r>
+          </a:p>
+          <a:p>
+            <a:endParaRPr lang="en-IN" dirty="0"/>
+          </a:p>
+          <a:p>
+            <a:r>
+              <a:rPr lang="en-IN" dirty="0"/>
+              <a:t>drawio.com</a:t>
+            </a:r>
           </a:p>
         </p:txBody>
       </p:sp>
@@ -2333,7 +2445,7 @@
           <a:p>
             <a:fld id="{8B4947A1-DD1C-416D-A736-E2AC1F216378}" type="slidenum">
               <a:rPr lang="en-IN" smtClean="0"/>
-              <a:t>5</a:t>
+              <a:t>4</a:t>
             </a:fld>
             <a:endParaRPr lang="en-IN"/>
           </a:p>
@@ -2342,7 +2454,7 @@
     </p:spTree>
     <p:extLst>
       <p:ext uri="{BB962C8B-B14F-4D97-AF65-F5344CB8AC3E}">
-        <p14:creationId xmlns:p14="http://schemas.microsoft.com/office/powerpoint/2010/main" val="2710254366"/>
+        <p14:creationId xmlns:p14="http://schemas.microsoft.com/office/powerpoint/2010/main" val="2129310089"/>
       </p:ext>
     </p:extLst>
   </p:cSld>
@@ -2396,6 +2508,7 @@
           <a:bodyPr/>
           <a:lstStyle/>
           <a:p>
+            <a:pPr algn="l"/>
             <a:r>
               <a:rPr lang="en-US" b="0" i="0" dirty="0">
                 <a:solidFill>
@@ -2404,8 +2517,207 @@
                 <a:effectLst/>
                 <a:latin typeface="Roboto" panose="02000000000000000000" pitchFamily="2" charset="0"/>
               </a:rPr>
-              <a:t>Data Modelling helps to create a conceptual model and create the relationship between the items. The basic techniques involve dealing with three perspectives of a data model.</a:t>
-            </a:r>
+              <a:t>Data Modelling is a process to formulate data in an information system in a structured format. Listed below are certain practical uses of the related tools in any sector or industry.</a:t>
+            </a:r>
+          </a:p>
+          <a:p>
+            <a:pPr algn="l">
+              <a:buFont typeface="Arial" panose="020B0604020202020204" pitchFamily="34" charset="0"/>
+              <a:buChar char="•"/>
+            </a:pPr>
+            <a:r>
+              <a:rPr lang="en-US" b="0" i="0" dirty="0">
+                <a:solidFill>
+                  <a:srgbClr val="394559"/>
+                </a:solidFill>
+                <a:effectLst/>
+                <a:latin typeface="Roboto" panose="02000000000000000000" pitchFamily="2" charset="0"/>
+              </a:rPr>
+              <a:t>It helps create a robust design with a data model that can show an organization's entire data on the same platform.</a:t>
+            </a:r>
+          </a:p>
+          <a:p>
+            <a:pPr algn="l">
+              <a:buFont typeface="Arial" panose="020B0604020202020204" pitchFamily="34" charset="0"/>
+              <a:buChar char="•"/>
+            </a:pPr>
+            <a:r>
+              <a:rPr lang="en-US" b="0" i="0" dirty="0">
+                <a:solidFill>
+                  <a:srgbClr val="394559"/>
+                </a:solidFill>
+                <a:effectLst/>
+                <a:latin typeface="Roboto" panose="02000000000000000000" pitchFamily="2" charset="0"/>
+              </a:rPr>
+              <a:t>The data model makes sure that all the data objects required by the database are represented or not.</a:t>
+            </a:r>
+          </a:p>
+          <a:p>
+            <a:pPr algn="l">
+              <a:buFont typeface="Arial" panose="020B0604020202020204" pitchFamily="34" charset="0"/>
+              <a:buChar char="•"/>
+            </a:pPr>
+            <a:r>
+              <a:rPr lang="en-US" b="0" i="0" dirty="0">
+                <a:solidFill>
+                  <a:srgbClr val="394559"/>
+                </a:solidFill>
+                <a:effectLst/>
+                <a:latin typeface="Roboto" panose="02000000000000000000" pitchFamily="2" charset="0"/>
+              </a:rPr>
+              <a:t>The database at the logical, physical, and conceptual levels can be designed with the help data model.</a:t>
+            </a:r>
+          </a:p>
+          <a:p>
+            <a:pPr algn="l">
+              <a:buFont typeface="Arial" panose="020B0604020202020204" pitchFamily="34" charset="0"/>
+              <a:buChar char="•"/>
+            </a:pPr>
+            <a:r>
+              <a:rPr lang="en-US" b="0" i="0" dirty="0">
+                <a:solidFill>
+                  <a:srgbClr val="394559"/>
+                </a:solidFill>
+                <a:effectLst/>
+                <a:latin typeface="Roboto" panose="02000000000000000000" pitchFamily="2" charset="0"/>
+              </a:rPr>
+              <a:t>The relation tables, foreign keys, and primary keys can be defined with the data model's help.</a:t>
+            </a:r>
+          </a:p>
+          <a:p>
+            <a:pPr algn="l">
+              <a:buFont typeface="Arial" panose="020B0604020202020204" pitchFamily="34" charset="0"/>
+              <a:buChar char="•"/>
+            </a:pPr>
+            <a:r>
+              <a:rPr lang="en-US" b="0" i="0" dirty="0">
+                <a:solidFill>
+                  <a:srgbClr val="394559"/>
+                </a:solidFill>
+                <a:effectLst/>
+                <a:latin typeface="Roboto" panose="02000000000000000000" pitchFamily="2" charset="0"/>
+              </a:rPr>
+              <a:t>The Tools help in the improvement of </a:t>
+            </a:r>
+            <a:r>
+              <a:rPr lang="en-US" b="0" i="0" u="none" strike="noStrike" dirty="0">
+                <a:solidFill>
+                  <a:srgbClr val="1450A8"/>
+                </a:solidFill>
+                <a:effectLst/>
+                <a:latin typeface="Roboto" panose="02000000000000000000" pitchFamily="2" charset="0"/>
+                <a:hlinkClick r:id="rId3"/>
+              </a:rPr>
+              <a:t>data quality</a:t>
+            </a:r>
+            <a:r>
+              <a:rPr lang="en-US" b="0" i="0" dirty="0">
+                <a:solidFill>
+                  <a:srgbClr val="394559"/>
+                </a:solidFill>
+                <a:effectLst/>
+                <a:latin typeface="Roboto" panose="02000000000000000000" pitchFamily="2" charset="0"/>
+              </a:rPr>
+              <a:t>.</a:t>
+            </a:r>
+          </a:p>
+          <a:p>
+            <a:pPr algn="l">
+              <a:buFont typeface="Arial" panose="020B0604020202020204" pitchFamily="34" charset="0"/>
+              <a:buChar char="•"/>
+            </a:pPr>
+            <a:r>
+              <a:rPr lang="en-US" b="0" i="0" dirty="0">
+                <a:solidFill>
+                  <a:srgbClr val="394559"/>
+                </a:solidFill>
+                <a:effectLst/>
+                <a:latin typeface="Roboto" panose="02000000000000000000" pitchFamily="2" charset="0"/>
+              </a:rPr>
+              <a:t>Data Model gives the clear picture of business requirements.</a:t>
+            </a:r>
+          </a:p>
+          <a:p>
+            <a:pPr algn="l">
+              <a:buFont typeface="Arial" panose="020B0604020202020204" pitchFamily="34" charset="0"/>
+              <a:buChar char="•"/>
+            </a:pPr>
+            <a:r>
+              <a:rPr lang="en-US" b="0" i="0" dirty="0">
+                <a:solidFill>
+                  <a:srgbClr val="394559"/>
+                </a:solidFill>
+                <a:effectLst/>
+                <a:latin typeface="Roboto" panose="02000000000000000000" pitchFamily="2" charset="0"/>
+              </a:rPr>
+              <a:t>Redundant data and missing data can be identified with the help of data models.</a:t>
+            </a:r>
+          </a:p>
+          <a:p>
+            <a:pPr algn="l">
+              <a:buFont typeface="Arial" panose="020B0604020202020204" pitchFamily="34" charset="0"/>
+              <a:buChar char="•"/>
+            </a:pPr>
+            <a:r>
+              <a:rPr lang="en-US" b="0" i="0" dirty="0">
+                <a:solidFill>
+                  <a:srgbClr val="394559"/>
+                </a:solidFill>
+                <a:effectLst/>
+                <a:latin typeface="Roboto" panose="02000000000000000000" pitchFamily="2" charset="0"/>
+              </a:rPr>
+              <a:t>In data models, all the important data is accurately represented. The chances of incorrect results and faulty reports decreased as the data model reduces data omission.</a:t>
+            </a:r>
+          </a:p>
+          <a:p>
+            <a:pPr algn="l">
+              <a:buFont typeface="Arial" panose="020B0604020202020204" pitchFamily="34" charset="0"/>
+              <a:buChar char="•"/>
+            </a:pPr>
+            <a:r>
+              <a:rPr lang="en-US" b="0" i="0" dirty="0">
+                <a:solidFill>
+                  <a:srgbClr val="394559"/>
+                </a:solidFill>
+                <a:effectLst/>
+                <a:latin typeface="Roboto" panose="02000000000000000000" pitchFamily="2" charset="0"/>
+              </a:rPr>
+              <a:t>The data models create a visual representation of the data. With the help of it, the data analysis gets improved. We get the data picture, which can then be used by developers to create a physical database.</a:t>
+            </a:r>
+          </a:p>
+          <a:p>
+            <a:pPr algn="l">
+              <a:buFont typeface="Arial" panose="020B0604020202020204" pitchFamily="34" charset="0"/>
+              <a:buChar char="•"/>
+            </a:pPr>
+            <a:r>
+              <a:rPr lang="en-US" b="0" i="0" dirty="0">
+                <a:solidFill>
+                  <a:srgbClr val="394559"/>
+                </a:solidFill>
+                <a:effectLst/>
+                <a:latin typeface="Roboto" panose="02000000000000000000" pitchFamily="2" charset="0"/>
+              </a:rPr>
+              <a:t>Better consistency can be qualified with the help of a data model across all the projects.</a:t>
+            </a:r>
+          </a:p>
+          <a:p>
+            <a:pPr algn="l">
+              <a:buFont typeface="Arial" panose="020B0604020202020204" pitchFamily="34" charset="0"/>
+              <a:buChar char="•"/>
+            </a:pPr>
+            <a:r>
+              <a:rPr lang="en-US" b="0" i="0" dirty="0">
+                <a:solidFill>
+                  <a:srgbClr val="394559"/>
+                </a:solidFill>
+                <a:effectLst/>
+                <a:latin typeface="Roboto" panose="02000000000000000000" pitchFamily="2" charset="0"/>
+              </a:rPr>
+              <a:t>The model is quite a time consuming, but it makes the maintenance cheaper and faster.</a:t>
+            </a:r>
+          </a:p>
+          <a:p>
             <a:endParaRPr lang="en-IN" dirty="0"/>
           </a:p>
         </p:txBody>
@@ -2427,7 +2739,7 @@
           <a:p>
             <a:fld id="{8B4947A1-DD1C-416D-A736-E2AC1F216378}" type="slidenum">
               <a:rPr lang="en-IN" smtClean="0"/>
-              <a:t>6</a:t>
+              <a:t>5</a:t>
             </a:fld>
             <a:endParaRPr lang="en-IN"/>
           </a:p>
@@ -2436,7 +2748,7 @@
     </p:spTree>
     <p:extLst>
       <p:ext uri="{BB962C8B-B14F-4D97-AF65-F5344CB8AC3E}">
-        <p14:creationId xmlns:p14="http://schemas.microsoft.com/office/powerpoint/2010/main" val="1019253893"/>
+        <p14:creationId xmlns:p14="http://schemas.microsoft.com/office/powerpoint/2010/main" val="2710254366"/>
       </p:ext>
     </p:extLst>
   </p:cSld>
@@ -2490,64 +2802,16 @@
           <a:bodyPr/>
           <a:lstStyle/>
           <a:p>
-            <a:pPr algn="l"/>
             <a:r>
               <a:rPr lang="en-US" b="0" i="0" dirty="0">
                 <a:solidFill>
-                  <a:srgbClr val="666666"/>
-                </a:solidFill>
-                <a:effectLst/>
-                <a:latin typeface="Roboto" panose="02000000000000000000" pitchFamily="2" charset="0"/>
-              </a:rPr>
-              <a:t>The conceptual data model is the very first and the most abstract data model in the data modeling process. It is a high-level diagram that we use to define, describe, organize, and present data elements and their relationships with relatively few details. Conceptual data models contain only:</a:t>
-            </a:r>
-          </a:p>
-          <a:p>
-            <a:pPr algn="l">
-              <a:buFont typeface="+mj-lt"/>
-              <a:buAutoNum type="arabicPeriod"/>
-            </a:pPr>
-            <a:r>
-              <a:rPr lang="en-US" b="0" i="0" dirty="0">
-                <a:solidFill>
-                  <a:srgbClr val="666666"/>
-                </a:solidFill>
-                <a:effectLst/>
-                <a:latin typeface="Roboto" panose="02000000000000000000" pitchFamily="2" charset="0"/>
-              </a:rPr>
-              <a:t>The real-world entities that are our main data elements.</a:t>
-            </a:r>
-          </a:p>
-          <a:p>
-            <a:pPr algn="l">
-              <a:buFont typeface="+mj-lt"/>
-              <a:buAutoNum type="arabicPeriod"/>
-            </a:pPr>
-            <a:r>
-              <a:rPr lang="en-US" b="0" i="0" dirty="0">
-                <a:solidFill>
-                  <a:srgbClr val="666666"/>
-                </a:solidFill>
-                <a:effectLst/>
-                <a:latin typeface="Roboto" panose="02000000000000000000" pitchFamily="2" charset="0"/>
-              </a:rPr>
-              <a:t>Their relationships.</a:t>
-            </a:r>
-          </a:p>
-          <a:p>
-            <a:pPr algn="l"/>
-            <a:r>
-              <a:rPr lang="en-US" b="0" i="0" dirty="0">
-                <a:solidFill>
-                  <a:srgbClr val="666666"/>
-                </a:solidFill>
-                <a:effectLst/>
-                <a:latin typeface="Roboto" panose="02000000000000000000" pitchFamily="2" charset="0"/>
-              </a:rPr>
-              <a:t>This model does not have technical details, such as attributes, data types, etc.</a:t>
-            </a:r>
-          </a:p>
-          <a:p>
+                  <a:srgbClr val="394559"/>
+                </a:solidFill>
+                <a:effectLst/>
+                <a:latin typeface="Roboto" panose="02000000000000000000" pitchFamily="2" charset="0"/>
+              </a:rPr>
+              <a:t>Data Modelling helps to create a conceptual model and create the relationship between the items. The basic techniques involve dealing with three perspectives of a data model.</a:t>
+            </a:r>
             <a:endParaRPr lang="en-IN" dirty="0"/>
           </a:p>
         </p:txBody>
@@ -2569,7 +2833,7 @@
           <a:p>
             <a:fld id="{8B4947A1-DD1C-416D-A736-E2AC1F216378}" type="slidenum">
               <a:rPr lang="en-IN" smtClean="0"/>
-              <a:t>7</a:t>
+              <a:t>6</a:t>
             </a:fld>
             <a:endParaRPr lang="en-IN"/>
           </a:p>
@@ -2578,7 +2842,7 @@
     </p:spTree>
     <p:extLst>
       <p:ext uri="{BB962C8B-B14F-4D97-AF65-F5344CB8AC3E}">
-        <p14:creationId xmlns:p14="http://schemas.microsoft.com/office/powerpoint/2010/main" val="1547996945"/>
+        <p14:creationId xmlns:p14="http://schemas.microsoft.com/office/powerpoint/2010/main" val="1019253893"/>
       </p:ext>
     </p:extLst>
   </p:cSld>
@@ -2632,26 +2896,61 @@
           <a:bodyPr/>
           <a:lstStyle/>
           <a:p>
-            <a:pPr marL="0" marR="0" lvl="0" indent="0" algn="l" defTabSz="914400" rtl="0" eaLnBrk="1" fontAlgn="auto" latinLnBrk="0" hangingPunct="1">
-              <a:lnSpc>
-                <a:spcPct val="100000"/>
-              </a:lnSpc>
-              <a:spcBef>
-                <a:spcPts val="0"/>
-              </a:spcBef>
-              <a:spcAft>
-                <a:spcPts val="0"/>
-              </a:spcAft>
-              <a:buClrTx/>
-              <a:buSzTx/>
-              <a:buFontTx/>
-              <a:buNone/>
-              <a:tabLst/>
-              <a:defRPr/>
+            <a:pPr algn="l"/>
+            <a:r>
+              <a:rPr lang="en-US" b="0" i="0" dirty="0">
+                <a:solidFill>
+                  <a:srgbClr val="666666"/>
+                </a:solidFill>
+                <a:effectLst/>
+                <a:latin typeface="Roboto" panose="02000000000000000000" pitchFamily="2" charset="0"/>
+              </a:rPr>
+              <a:t>The conceptual data model is the very first and the most abstract data model in the data modeling process. It is a high-level diagram that we use to define, describe, organize, and present data elements and their relationships with relatively few details. Conceptual data models contain only:</a:t>
+            </a:r>
+          </a:p>
+          <a:p>
+            <a:pPr algn="l">
+              <a:buFont typeface="+mj-lt"/>
+              <a:buAutoNum type="arabicPeriod"/>
             </a:pPr>
             <a:r>
-              <a:rPr lang="en-US" dirty="0"/>
-              <a:t>What will I store in my purchasing system? The entities below are the real-world objects that I’ll need to track in my database. I think you’ll quickly understand what each entity represents:</a:t>
+              <a:rPr lang="en-US" b="0" i="0" dirty="0">
+                <a:solidFill>
+                  <a:srgbClr val="666666"/>
+                </a:solidFill>
+                <a:effectLst/>
+                <a:latin typeface="Roboto" panose="02000000000000000000" pitchFamily="2" charset="0"/>
+              </a:rPr>
+              <a:t>The real-world entities that are our main data elements.</a:t>
+            </a:r>
+          </a:p>
+          <a:p>
+            <a:pPr algn="l">
+              <a:buFont typeface="+mj-lt"/>
+              <a:buAutoNum type="arabicPeriod"/>
+            </a:pPr>
+            <a:r>
+              <a:rPr lang="en-US" b="0" i="0" dirty="0">
+                <a:solidFill>
+                  <a:srgbClr val="666666"/>
+                </a:solidFill>
+                <a:effectLst/>
+                <a:latin typeface="Roboto" panose="02000000000000000000" pitchFamily="2" charset="0"/>
+              </a:rPr>
+              <a:t>Their relationships.</a:t>
+            </a:r>
+          </a:p>
+          <a:p>
+            <a:pPr algn="l"/>
+            <a:r>
+              <a:rPr lang="en-US" b="0" i="0" dirty="0">
+                <a:solidFill>
+                  <a:srgbClr val="666666"/>
+                </a:solidFill>
+                <a:effectLst/>
+                <a:latin typeface="Roboto" panose="02000000000000000000" pitchFamily="2" charset="0"/>
+              </a:rPr>
+              <a:t>This model does not have technical details, such as attributes, data types, etc.</a:t>
             </a:r>
           </a:p>
           <a:p>
@@ -2676,7 +2975,7 @@
           <a:p>
             <a:fld id="{8B4947A1-DD1C-416D-A736-E2AC1F216378}" type="slidenum">
               <a:rPr lang="en-IN" smtClean="0"/>
-              <a:t>8</a:t>
+              <a:t>7</a:t>
             </a:fld>
             <a:endParaRPr lang="en-IN"/>
           </a:p>
@@ -2685,7 +2984,7 @@
     </p:spTree>
     <p:extLst>
       <p:ext uri="{BB962C8B-B14F-4D97-AF65-F5344CB8AC3E}">
-        <p14:creationId xmlns:p14="http://schemas.microsoft.com/office/powerpoint/2010/main" val="2757751510"/>
+        <p14:creationId xmlns:p14="http://schemas.microsoft.com/office/powerpoint/2010/main" val="1547996945"/>
       </p:ext>
     </p:extLst>
   </p:cSld>
@@ -2739,80 +3038,26 @@
           <a:bodyPr/>
           <a:lstStyle/>
           <a:p>
-            <a:pPr algn="l"/>
-            <a:r>
-              <a:rPr lang="en-US" b="0" i="0" dirty="0">
-                <a:solidFill>
-                  <a:srgbClr val="666666"/>
-                </a:solidFill>
-                <a:effectLst/>
-                <a:latin typeface="Roboto" panose="02000000000000000000" pitchFamily="2" charset="0"/>
-              </a:rPr>
-              <a:t>And these are the relationships between these entities:</a:t>
-            </a:r>
-          </a:p>
-          <a:p>
-            <a:pPr algn="l">
-              <a:buFont typeface="Arial" panose="020B0604020202020204" pitchFamily="34" charset="0"/>
-              <a:buChar char="•"/>
+            <a:pPr marL="0" marR="0" lvl="0" indent="0" algn="l" defTabSz="914400" rtl="0" eaLnBrk="1" fontAlgn="auto" latinLnBrk="0" hangingPunct="1">
+              <a:lnSpc>
+                <a:spcPct val="100000"/>
+              </a:lnSpc>
+              <a:spcBef>
+                <a:spcPts val="0"/>
+              </a:spcBef>
+              <a:spcAft>
+                <a:spcPts val="0"/>
+              </a:spcAft>
+              <a:buClrTx/>
+              <a:buSzTx/>
+              <a:buFontTx/>
+              <a:buNone/>
+              <a:tabLst/>
+              <a:defRPr/>
             </a:pPr>
             <a:r>
-              <a:rPr lang="en-US" b="0" i="0" dirty="0">
-                <a:solidFill>
-                  <a:srgbClr val="666666"/>
-                </a:solidFill>
-                <a:effectLst/>
-                <a:latin typeface="Roboto" panose="02000000000000000000" pitchFamily="2" charset="0"/>
-              </a:rPr>
-              <a:t>A Purchasing Order has many Purchasing Order Items A Purchasing Order Item can belong to only one Purchasing Order. That means the Purchasing Order and Purchasing Order Item entities have a one-to-many relationship.</a:t>
-            </a:r>
-          </a:p>
-          <a:p>
-            <a:pPr algn="l">
-              <a:buFont typeface="Arial" panose="020B0604020202020204" pitchFamily="34" charset="0"/>
-              <a:buChar char="•"/>
-            </a:pPr>
-            <a:r>
-              <a:rPr lang="en-US" b="0" i="0" dirty="0">
-                <a:solidFill>
-                  <a:srgbClr val="666666"/>
-                </a:solidFill>
-                <a:effectLst/>
-                <a:latin typeface="Roboto" panose="02000000000000000000" pitchFamily="2" charset="0"/>
-              </a:rPr>
-              <a:t>Many Purchasing Orders can be sent to one Supplier. Thus, there will be a one-to-many relationship between the Supplier and Purchasing Order And having a Supplier should be mandatory for all Purchasing Orders.</a:t>
-            </a:r>
-          </a:p>
-          <a:p>
-            <a:pPr algn="l">
-              <a:buFont typeface="Arial" panose="020B0604020202020204" pitchFamily="34" charset="0"/>
-              <a:buChar char="•"/>
-            </a:pPr>
-            <a:r>
-              <a:rPr lang="en-US" b="0" i="0" dirty="0">
-                <a:solidFill>
-                  <a:srgbClr val="666666"/>
-                </a:solidFill>
-                <a:effectLst/>
-                <a:latin typeface="Roboto" panose="02000000000000000000" pitchFamily="2" charset="0"/>
-              </a:rPr>
-              <a:t>One Purchasing Order Item should have one Stock Item, but one Stock Item may have zero or many Purchasing Order Items. That means that between Stock Item and Purchasing Order Item there is a one-mandatory-to-many-optional relationship.</a:t>
-            </a:r>
-          </a:p>
-          <a:p>
-            <a:pPr algn="l">
-              <a:buFont typeface="Arial" panose="020B0604020202020204" pitchFamily="34" charset="0"/>
-              <a:buChar char="•"/>
-            </a:pPr>
-            <a:r>
-              <a:rPr lang="en-US" b="0" i="0" dirty="0">
-                <a:solidFill>
-                  <a:srgbClr val="666666"/>
-                </a:solidFill>
-                <a:effectLst/>
-                <a:latin typeface="Roboto" panose="02000000000000000000" pitchFamily="2" charset="0"/>
-              </a:rPr>
-              <a:t>When ordered items are received for a Purchasing Order, we create a Good Received Note (GRN) for each Purchasing Order Item. Assuming ordered items for a Purchasing Order can be delivered by the supplier either at once or as split deliveries, a Purchasing Order Item can have zero or many Good Received Notes. However, one Good Received Note can belong to only one mandatory Purchasing Order Item. Thus, Purchasing Order Item and Good Received Note have a one-mandatory-to-many-optional relationship.</a:t>
+              <a:rPr lang="en-US" dirty="0"/>
+              <a:t>What will I store in my purchasing system? The entities below are the real-world objects that I’ll need to track in my database. I think you’ll quickly understand what each entity represents:</a:t>
             </a:r>
           </a:p>
           <a:p>
@@ -2837,7 +3082,7 @@
           <a:p>
             <a:fld id="{8B4947A1-DD1C-416D-A736-E2AC1F216378}" type="slidenum">
               <a:rPr lang="en-IN" smtClean="0"/>
-              <a:t>9</a:t>
+              <a:t>8</a:t>
             </a:fld>
             <a:endParaRPr lang="en-IN"/>
           </a:p>
@@ -2846,7 +3091,7 @@
     </p:spTree>
     <p:extLst>
       <p:ext uri="{BB962C8B-B14F-4D97-AF65-F5344CB8AC3E}">
-        <p14:creationId xmlns:p14="http://schemas.microsoft.com/office/powerpoint/2010/main" val="1287645384"/>
+        <p14:creationId xmlns:p14="http://schemas.microsoft.com/office/powerpoint/2010/main" val="2757751510"/>
       </p:ext>
     </p:extLst>
   </p:cSld>
@@ -2909,20 +3154,7 @@
                 <a:effectLst/>
                 <a:latin typeface="Roboto" panose="02000000000000000000" pitchFamily="2" charset="0"/>
               </a:rPr>
-              <a:t>This is an ER diagram of a conceptual data model for a simple employee management system. In this company, there are many departments and many employees in each department. Employees are assigned to different projects and can only work on one project at a time; some employees may not have been assigned to any projects. Each employee has a role (i.e. a job role); many employees can have the same role. Also, there may be vacant roles. Each employee has a login to access the company’s common network, but there are different user privileges.</a:t>
-            </a:r>
-          </a:p>
-          <a:p>
-            <a:pPr algn="l"/>
-            <a:r>
-              <a:rPr lang="en-US" b="0" i="0" dirty="0">
-                <a:solidFill>
-                  <a:srgbClr val="666666"/>
-                </a:solidFill>
-                <a:effectLst/>
-                <a:latin typeface="Roboto" panose="02000000000000000000" pitchFamily="2" charset="0"/>
-              </a:rPr>
-              <a:t>To support these business requirements, I have designed the conceptual data model shown above. It has five entities (Employee, Department, Project, Role, and Login) that reflect the real-world entity information in the physical database. There are four relationships that support the described business scenario:</a:t>
+              <a:t>And these are the relationships between these entities:</a:t>
             </a:r>
           </a:p>
           <a:p>
@@ -2931,24 +3163,14 @@
               <a:buChar char="•"/>
             </a:pPr>
             <a:r>
-              <a:rPr lang="en-US" b="0" i="0" dirty="0" err="1">
+              <a:rPr lang="en-US" b="0" i="0" dirty="0">
                 <a:solidFill>
                   <a:srgbClr val="666666"/>
                 </a:solidFill>
                 <a:effectLst/>
                 <a:latin typeface="Roboto" panose="02000000000000000000" pitchFamily="2" charset="0"/>
               </a:rPr>
-              <a:t>Department_Employee</a:t>
-            </a:r>
-            <a:r>
-              <a:rPr lang="en-US" b="0" i="0" dirty="0">
-                <a:solidFill>
-                  <a:srgbClr val="666666"/>
-                </a:solidFill>
-                <a:effectLst/>
-                <a:latin typeface="Roboto" panose="02000000000000000000" pitchFamily="2" charset="0"/>
-              </a:rPr>
-              <a:t>: A one-mandatory-to-many-mandatory relationship.</a:t>
+              <a:t>A Purchasing Order has many Purchasing Order Items A Purchasing Order Item can belong to only one Purchasing Order. That means the Purchasing Order and Purchasing Order Item entities have a one-to-many relationship.</a:t>
             </a:r>
           </a:p>
           <a:p>
@@ -2957,24 +3179,14 @@
               <a:buChar char="•"/>
             </a:pPr>
             <a:r>
-              <a:rPr lang="en-US" b="0" i="0" dirty="0" err="1">
+              <a:rPr lang="en-US" b="0" i="0" dirty="0">
                 <a:solidFill>
                   <a:srgbClr val="666666"/>
                 </a:solidFill>
                 <a:effectLst/>
                 <a:latin typeface="Roboto" panose="02000000000000000000" pitchFamily="2" charset="0"/>
               </a:rPr>
-              <a:t>Project_Employee</a:t>
-            </a:r>
-            <a:r>
-              <a:rPr lang="en-US" b="0" i="0" dirty="0">
-                <a:solidFill>
-                  <a:srgbClr val="666666"/>
-                </a:solidFill>
-                <a:effectLst/>
-                <a:latin typeface="Roboto" panose="02000000000000000000" pitchFamily="2" charset="0"/>
-              </a:rPr>
-              <a:t>: A one-optional-to-many-mandatory relationship.</a:t>
+              <a:t>Many Purchasing Orders can be sent to one Supplier. Thus, there will be a one-to-many relationship between the Supplier and Purchasing Order And having a Supplier should be mandatory for all Purchasing Orders.</a:t>
             </a:r>
           </a:p>
           <a:p>
@@ -2983,24 +3195,14 @@
               <a:buChar char="•"/>
             </a:pPr>
             <a:r>
-              <a:rPr lang="en-US" b="0" i="0" dirty="0" err="1">
+              <a:rPr lang="en-US" b="0" i="0" dirty="0">
                 <a:solidFill>
                   <a:srgbClr val="666666"/>
                 </a:solidFill>
                 <a:effectLst/>
                 <a:latin typeface="Roboto" panose="02000000000000000000" pitchFamily="2" charset="0"/>
               </a:rPr>
-              <a:t>Role_Employee</a:t>
-            </a:r>
-            <a:r>
-              <a:rPr lang="en-US" b="0" i="0" dirty="0">
-                <a:solidFill>
-                  <a:srgbClr val="666666"/>
-                </a:solidFill>
-                <a:effectLst/>
-                <a:latin typeface="Roboto" panose="02000000000000000000" pitchFamily="2" charset="0"/>
-              </a:rPr>
-              <a:t>: A one-mandatory-to-many-optional relationship.</a:t>
+              <a:t>One Purchasing Order Item should have one Stock Item, but one Stock Item may have zero or many Purchasing Order Items. That means that between Stock Item and Purchasing Order Item there is a one-mandatory-to-many-optional relationship.</a:t>
             </a:r>
           </a:p>
           <a:p>
@@ -3009,24 +3211,14 @@
               <a:buChar char="•"/>
             </a:pPr>
             <a:r>
-              <a:rPr lang="en-US" b="0" i="0" dirty="0" err="1">
+              <a:rPr lang="en-US" b="0" i="0" dirty="0">
                 <a:solidFill>
                   <a:srgbClr val="666666"/>
                 </a:solidFill>
                 <a:effectLst/>
                 <a:latin typeface="Roboto" panose="02000000000000000000" pitchFamily="2" charset="0"/>
               </a:rPr>
-              <a:t>Employee_Login</a:t>
-            </a:r>
-            <a:r>
-              <a:rPr lang="en-US" b="0" i="0" dirty="0">
-                <a:solidFill>
-                  <a:srgbClr val="666666"/>
-                </a:solidFill>
-                <a:effectLst/>
-                <a:latin typeface="Roboto" panose="02000000000000000000" pitchFamily="2" charset="0"/>
-              </a:rPr>
-              <a:t>: A one-mandatory-to-one-mandatory relationship.</a:t>
+              <a:t>When ordered items are received for a Purchasing Order, we create a Good Received Note (GRN) for each Purchasing Order Item. Assuming ordered items for a Purchasing Order can be delivered by the supplier either at once or as split deliveries, a Purchasing Order Item can have zero or many Good Received Notes. However, one Good Received Note can belong to only one mandatory Purchasing Order Item. Thus, Purchasing Order Item and Good Received Note have a one-mandatory-to-many-optional relationship.</a:t>
             </a:r>
           </a:p>
           <a:p>
@@ -3051,7 +3243,7 @@
           <a:p>
             <a:fld id="{8B4947A1-DD1C-416D-A736-E2AC1F216378}" type="slidenum">
               <a:rPr lang="en-IN" smtClean="0"/>
-              <a:t>10</a:t>
+              <a:t>9</a:t>
             </a:fld>
             <a:endParaRPr lang="en-IN"/>
           </a:p>
@@ -3060,7 +3252,7 @@
     </p:spTree>
     <p:extLst>
       <p:ext uri="{BB962C8B-B14F-4D97-AF65-F5344CB8AC3E}">
-        <p14:creationId xmlns:p14="http://schemas.microsoft.com/office/powerpoint/2010/main" val="644556097"/>
+        <p14:creationId xmlns:p14="http://schemas.microsoft.com/office/powerpoint/2010/main" val="1287645384"/>
       </p:ext>
     </p:extLst>
   </p:cSld>
@@ -3114,6 +3306,7 @@
           <a:bodyPr/>
           <a:lstStyle/>
           <a:p>
+            <a:pPr algn="l"/>
             <a:r>
               <a:rPr lang="en-US" b="0" i="0" dirty="0">
                 <a:solidFill>
@@ -3122,26 +3315,8 @@
                 <a:effectLst/>
                 <a:latin typeface="Roboto" panose="02000000000000000000" pitchFamily="2" charset="0"/>
               </a:rPr>
-              <a:t>This is a conceptual data model for a simple order management system for a wholesale store. Customers send orders to the store, although some customers may not have sent any orders yet. An order has many order items, and each order item is for one product. There may be products that do not have an order. After gathering the products into an order, an invoice will be prepared for that order. An invoice has many invoice items, with one product in each invoice item.</a:t>
-            </a:r>
-          </a:p>
-          <a:p>
-            <a:endParaRPr lang="en-US" b="0" i="0" dirty="0">
-              <a:solidFill>
-                <a:srgbClr val="666666"/>
-              </a:solidFill>
-              <a:effectLst/>
-              <a:latin typeface="Roboto" panose="02000000000000000000" pitchFamily="2" charset="0"/>
-            </a:endParaRPr>
-          </a:p>
-          <a:p>
-            <a:endParaRPr lang="en-US" b="0" i="0" dirty="0">
-              <a:solidFill>
-                <a:srgbClr val="666666"/>
-              </a:solidFill>
-              <a:effectLst/>
-              <a:latin typeface="Roboto" panose="02000000000000000000" pitchFamily="2" charset="0"/>
-            </a:endParaRPr>
+              <a:t>This is an ER diagram of a conceptual data model for a simple employee management system. In this company, there are many departments and many employees in each department. Employees are assigned to different projects and can only work on one project at a time; some employees may not have been assigned to any projects. Each employee has a role (i.e. a job role); many employees can have the same role. Also, there may be vacant roles. Each employee has a login to access the company’s common network, but there are different user privileges.</a:t>
+            </a:r>
           </a:p>
           <a:p>
             <a:pPr algn="l"/>
@@ -3153,20 +3328,7 @@
                 <a:effectLst/>
                 <a:latin typeface="Roboto" panose="02000000000000000000" pitchFamily="2" charset="0"/>
               </a:rPr>
-              <a:t>This ER diagram shows how we’ll support the above business requirements. The model has six entities (Customer, Order, Order Item, Product, Invoice, and Invoice Item) that represent the real-world information in our physical database.</a:t>
-            </a:r>
-          </a:p>
-          <a:p>
-            <a:pPr algn="l"/>
-            <a:r>
-              <a:rPr lang="en-US" b="0" i="0" dirty="0">
-                <a:solidFill>
-                  <a:srgbClr val="666666"/>
-                </a:solidFill>
-                <a:effectLst/>
-                <a:latin typeface="Roboto" panose="02000000000000000000" pitchFamily="2" charset="0"/>
-              </a:rPr>
-              <a:t>There are six relationships in this data model:</a:t>
+              <a:t>To support these business requirements, I have designed the conceptual data model shown above. It has five entities (Employee, Department, Project, Role, and Login) that reflect the real-world entity information in the physical database. There are four relationships that support the described business scenario:</a:t>
             </a:r>
           </a:p>
           <a:p>
@@ -3182,7 +3344,7 @@
                 <a:effectLst/>
                 <a:latin typeface="Roboto" panose="02000000000000000000" pitchFamily="2" charset="0"/>
               </a:rPr>
-              <a:t>Customer_Order</a:t>
+              <a:t>Department_Employee</a:t>
             </a:r>
             <a:r>
               <a:rPr lang="en-US" b="0" i="0" dirty="0">
@@ -3192,7 +3354,7 @@
                 <a:effectLst/>
                 <a:latin typeface="Roboto" panose="02000000000000000000" pitchFamily="2" charset="0"/>
               </a:rPr>
-              <a:t>: A one-mandatory-to-many-optional relationship.</a:t>
+              <a:t>: A one-mandatory-to-many-mandatory relationship.</a:t>
             </a:r>
           </a:p>
           <a:p>
@@ -3208,7 +3370,7 @@
                 <a:effectLst/>
                 <a:latin typeface="Roboto" panose="02000000000000000000" pitchFamily="2" charset="0"/>
               </a:rPr>
-              <a:t>Order_Order</a:t>
+              <a:t>Project_Employee</a:t>
             </a:r>
             <a:r>
               <a:rPr lang="en-US" b="0" i="0" dirty="0">
@@ -3218,7 +3380,7 @@
                 <a:effectLst/>
                 <a:latin typeface="Roboto" panose="02000000000000000000" pitchFamily="2" charset="0"/>
               </a:rPr>
-              <a:t> Item: A one-mandatory-to-many-mandatory relationship.</a:t>
+              <a:t>: A one-optional-to-many-mandatory relationship.</a:t>
             </a:r>
           </a:p>
           <a:p>
@@ -3234,7 +3396,7 @@
                 <a:effectLst/>
                 <a:latin typeface="Roboto" panose="02000000000000000000" pitchFamily="2" charset="0"/>
               </a:rPr>
-              <a:t>Product_Order</a:t>
+              <a:t>Role_Employee</a:t>
             </a:r>
             <a:r>
               <a:rPr lang="en-US" b="0" i="0" dirty="0">
@@ -3244,7 +3406,7 @@
                 <a:effectLst/>
                 <a:latin typeface="Roboto" panose="02000000000000000000" pitchFamily="2" charset="0"/>
               </a:rPr>
-              <a:t> Item: A one-mandatory-to-many-optional relationship.</a:t>
+              <a:t>: A one-mandatory-to-many-optional relationship.</a:t>
             </a:r>
           </a:p>
           <a:p>
@@ -3260,7 +3422,7 @@
                 <a:effectLst/>
                 <a:latin typeface="Roboto" panose="02000000000000000000" pitchFamily="2" charset="0"/>
               </a:rPr>
-              <a:t>Order_Invoice</a:t>
+              <a:t>Employee_Login</a:t>
             </a:r>
             <a:r>
               <a:rPr lang="en-US" b="0" i="0" dirty="0">
@@ -3270,59 +3432,7 @@
                 <a:effectLst/>
                 <a:latin typeface="Roboto" panose="02000000000000000000" pitchFamily="2" charset="0"/>
               </a:rPr>
-              <a:t>: A one-mandatory-to-one-optional relationship.</a:t>
-            </a:r>
-          </a:p>
-          <a:p>
-            <a:pPr algn="l">
-              <a:buFont typeface="Arial" panose="020B0604020202020204" pitchFamily="34" charset="0"/>
-              <a:buChar char="•"/>
-            </a:pPr>
-            <a:r>
-              <a:rPr lang="en-US" b="0" i="0" dirty="0" err="1">
-                <a:solidFill>
-                  <a:srgbClr val="666666"/>
-                </a:solidFill>
-                <a:effectLst/>
-                <a:latin typeface="Roboto" panose="02000000000000000000" pitchFamily="2" charset="0"/>
-              </a:rPr>
-              <a:t>Invoice_Invoice</a:t>
-            </a:r>
-            <a:r>
-              <a:rPr lang="en-US" b="0" i="0" dirty="0">
-                <a:solidFill>
-                  <a:srgbClr val="666666"/>
-                </a:solidFill>
-                <a:effectLst/>
-                <a:latin typeface="Roboto" panose="02000000000000000000" pitchFamily="2" charset="0"/>
-              </a:rPr>
-              <a:t> Item: A one-mandatory-to-many-mandatory relationship.</a:t>
-            </a:r>
-          </a:p>
-          <a:p>
-            <a:pPr algn="l">
-              <a:buFont typeface="Arial" panose="020B0604020202020204" pitchFamily="34" charset="0"/>
-              <a:buChar char="•"/>
-            </a:pPr>
-            <a:r>
-              <a:rPr lang="en-US" b="0" i="0" dirty="0" err="1">
-                <a:solidFill>
-                  <a:srgbClr val="666666"/>
-                </a:solidFill>
-                <a:effectLst/>
-                <a:latin typeface="Roboto" panose="02000000000000000000" pitchFamily="2" charset="0"/>
-              </a:rPr>
-              <a:t>Product_Invoice</a:t>
-            </a:r>
-            <a:r>
-              <a:rPr lang="en-US" b="0" i="0" dirty="0">
-                <a:solidFill>
-                  <a:srgbClr val="666666"/>
-                </a:solidFill>
-                <a:effectLst/>
-                <a:latin typeface="Roboto" panose="02000000000000000000" pitchFamily="2" charset="0"/>
-              </a:rPr>
-              <a:t> Item: A one-mandatory-to-many-optional relationship.</a:t>
+              <a:t>: A one-mandatory-to-one-mandatory relationship.</a:t>
             </a:r>
           </a:p>
           <a:p>
@@ -3347,7 +3457,7 @@
           <a:p>
             <a:fld id="{8B4947A1-DD1C-416D-A736-E2AC1F216378}" type="slidenum">
               <a:rPr lang="en-IN" smtClean="0"/>
-              <a:t>11</a:t>
+              <a:t>10</a:t>
             </a:fld>
             <a:endParaRPr lang="en-IN"/>
           </a:p>
@@ -3356,7 +3466,7 @@
     </p:spTree>
     <p:extLst>
       <p:ext uri="{BB962C8B-B14F-4D97-AF65-F5344CB8AC3E}">
-        <p14:creationId xmlns:p14="http://schemas.microsoft.com/office/powerpoint/2010/main" val="2119904506"/>
+        <p14:creationId xmlns:p14="http://schemas.microsoft.com/office/powerpoint/2010/main" val="644556097"/>
       </p:ext>
     </p:extLst>
   </p:cSld>
@@ -7819,9 +7929,10 @@
           <a:p>
             <a:pPr lvl="1"/>
             <a:r>
-              <a:rPr lang="en-US" dirty="0"/>
-              <a:t>Object-oriented Model</a:t>
-            </a:r>
+              <a:rPr lang="en-US"/>
+              <a:t>Network Model</a:t>
+            </a:r>
+            <a:endParaRPr lang="en-US" dirty="0"/>
           </a:p>
           <a:p>
             <a:pPr lvl="1"/>

</xml_diff>